<commit_message>
some slides. Fix to TTR homeworks
</commit_message>
<xml_diff>
--- a/slides/06-Search-LocalSearch.pptx
+++ b/slides/06-Search-LocalSearch.pptx
@@ -995,7 +995,7 @@
           <a:lstStyle/>
           <a:p>
             <a:pPr eaLnBrk="1" hangingPunct="1"/>
-            <a:endParaRPr lang="nl-NL" smtClean="0"/>
+            <a:endParaRPr lang="nl-NL"/>
           </a:p>
         </p:txBody>
       </p:sp>
@@ -1100,7 +1100,7 @@
           <a:lstStyle/>
           <a:p>
             <a:pPr eaLnBrk="1" hangingPunct="1"/>
-            <a:endParaRPr lang="nl-NL" smtClean="0"/>
+            <a:endParaRPr lang="nl-NL"/>
           </a:p>
         </p:txBody>
       </p:sp>
@@ -1161,7 +1161,7 @@
           </a:lstStyle>
           <a:p>
             <a:r>
-              <a:rPr lang="en-US" smtClean="0"/>
+              <a:rPr lang="en-US"/>
               <a:t>Click to edit Master title style</a:t>
             </a:r>
             <a:endParaRPr lang="en-US" dirty="0"/>
@@ -1278,7 +1278,7 @@
           </a:lstStyle>
           <a:p>
             <a:r>
-              <a:rPr lang="en-US" smtClean="0"/>
+              <a:rPr lang="en-US"/>
               <a:t>Click to edit Master subtitle style</a:t>
             </a:r>
             <a:endParaRPr lang="en-US" dirty="0"/>
@@ -1301,10 +1301,9 @@
           <a:lstStyle/>
           <a:p>
             <a:r>
-              <a:rPr lang="en-US" smtClean="0"/>
+              <a:rPr lang="en-US"/>
               <a:t>10/20/2010</a:t>
             </a:r>
-            <a:endParaRPr lang="en-US"/>
           </a:p>
         </p:txBody>
       </p:sp>
@@ -1438,7 +1437,7 @@
           </a:lstStyle>
           <a:p>
             <a:r>
-              <a:rPr lang="en-US" smtClean="0"/>
+              <a:rPr lang="en-US"/>
               <a:t>Click to edit Master title style</a:t>
             </a:r>
             <a:endParaRPr lang="en-US" dirty="0"/>
@@ -1512,7 +1511,7 @@
           </a:lstStyle>
           <a:p>
             <a:r>
-              <a:rPr lang="en-US" smtClean="0"/>
+              <a:rPr lang="en-US"/>
               <a:t>Click icon to add picture</a:t>
             </a:r>
             <a:endParaRPr lang="en-US" dirty="0"/>
@@ -1578,7 +1577,7 @@
           <a:p>
             <a:pPr lvl="0"/>
             <a:r>
-              <a:rPr lang="en-US" smtClean="0"/>
+              <a:rPr lang="en-US"/>
               <a:t>Click to edit Master text styles</a:t>
             </a:r>
           </a:p>
@@ -1600,10 +1599,9 @@
           <a:lstStyle/>
           <a:p>
             <a:r>
-              <a:rPr lang="en-US" smtClean="0"/>
+              <a:rPr lang="en-US"/>
               <a:t>10/20/2010</a:t>
             </a:r>
-            <a:endParaRPr lang="en-US"/>
           </a:p>
         </p:txBody>
       </p:sp>
@@ -1705,7 +1703,7 @@
           </a:lstStyle>
           <a:p>
             <a:r>
-              <a:rPr lang="en-US" smtClean="0"/>
+              <a:rPr lang="en-US"/>
               <a:t>Click to edit Master title style</a:t>
             </a:r>
             <a:endParaRPr lang="en-US" dirty="0"/>
@@ -1771,7 +1769,7 @@
           <a:p>
             <a:pPr lvl="0"/>
             <a:r>
-              <a:rPr lang="en-US" smtClean="0"/>
+              <a:rPr lang="en-US"/>
               <a:t>Click to edit Master text styles</a:t>
             </a:r>
           </a:p>
@@ -1793,10 +1791,9 @@
           <a:lstStyle/>
           <a:p>
             <a:r>
-              <a:rPr lang="en-US" smtClean="0"/>
+              <a:rPr lang="en-US"/>
               <a:t>10/20/2010</a:t>
             </a:r>
-            <a:endParaRPr lang="en-US"/>
           </a:p>
         </p:txBody>
       </p:sp>
@@ -1898,7 +1895,7 @@
           </a:lstStyle>
           <a:p>
             <a:r>
-              <a:rPr lang="en-US" smtClean="0"/>
+              <a:rPr lang="en-US"/>
               <a:t>Click to edit Master title style</a:t>
             </a:r>
             <a:endParaRPr lang="en-US" dirty="0"/>
@@ -1966,7 +1963,7 @@
           <a:p>
             <a:pPr lvl="0"/>
             <a:r>
-              <a:rPr lang="en-US" smtClean="0"/>
+              <a:rPr lang="en-US"/>
               <a:t>Click to edit Master text styles</a:t>
             </a:r>
           </a:p>
@@ -2033,7 +2030,7 @@
           <a:p>
             <a:pPr lvl="0"/>
             <a:r>
-              <a:rPr lang="en-US" smtClean="0"/>
+              <a:rPr lang="en-US"/>
               <a:t>Click to edit Master text styles</a:t>
             </a:r>
           </a:p>
@@ -2055,10 +2052,9 @@
           <a:lstStyle/>
           <a:p>
             <a:r>
-              <a:rPr lang="en-US" smtClean="0"/>
+              <a:rPr lang="en-US"/>
               <a:t>10/20/2010</a:t>
             </a:r>
-            <a:endParaRPr lang="en-US"/>
           </a:p>
         </p:txBody>
       </p:sp>
@@ -2392,7 +2388,7 @@
           </a:lstStyle>
           <a:p>
             <a:r>
-              <a:rPr lang="en-US" smtClean="0"/>
+              <a:rPr lang="en-US"/>
               <a:t>Click to edit Master title style</a:t>
             </a:r>
             <a:endParaRPr lang="en-US" dirty="0"/>
@@ -2458,7 +2454,7 @@
           <a:p>
             <a:pPr lvl="0"/>
             <a:r>
-              <a:rPr lang="en-US" smtClean="0"/>
+              <a:rPr lang="en-US"/>
               <a:t>Click to edit Master text styles</a:t>
             </a:r>
           </a:p>
@@ -2480,10 +2476,9 @@
           <a:lstStyle/>
           <a:p>
             <a:r>
-              <a:rPr lang="en-US" smtClean="0"/>
+              <a:rPr lang="en-US"/>
               <a:t>10/20/2010</a:t>
             </a:r>
-            <a:endParaRPr lang="en-US"/>
           </a:p>
         </p:txBody>
       </p:sp>
@@ -2581,7 +2576,7 @@
           <a:lstStyle/>
           <a:p>
             <a:r>
-              <a:rPr lang="en-US" smtClean="0"/>
+              <a:rPr lang="en-US"/>
               <a:t>Click to edit Master title style</a:t>
             </a:r>
             <a:endParaRPr lang="en-US" dirty="0"/>
@@ -2653,7 +2648,7 @@
           <a:p>
             <a:pPr lvl="0"/>
             <a:r>
-              <a:rPr lang="en-US" smtClean="0"/>
+              <a:rPr lang="en-US"/>
               <a:t>Click to edit Master text styles</a:t>
             </a:r>
           </a:p>
@@ -2720,7 +2715,7 @@
           <a:p>
             <a:pPr lvl="0"/>
             <a:r>
-              <a:rPr lang="en-US" smtClean="0"/>
+              <a:rPr lang="en-US"/>
               <a:t>Click to edit Master text styles</a:t>
             </a:r>
           </a:p>
@@ -2791,7 +2786,7 @@
           <a:p>
             <a:pPr lvl="0"/>
             <a:r>
-              <a:rPr lang="en-US" smtClean="0"/>
+              <a:rPr lang="en-US"/>
               <a:t>Click to edit Master text styles</a:t>
             </a:r>
           </a:p>
@@ -2858,7 +2853,7 @@
           <a:p>
             <a:pPr lvl="0"/>
             <a:r>
-              <a:rPr lang="en-US" smtClean="0"/>
+              <a:rPr lang="en-US"/>
               <a:t>Click to edit Master text styles</a:t>
             </a:r>
           </a:p>
@@ -2929,7 +2924,7 @@
           <a:p>
             <a:pPr lvl="0"/>
             <a:r>
-              <a:rPr lang="en-US" smtClean="0"/>
+              <a:rPr lang="en-US"/>
               <a:t>Click to edit Master text styles</a:t>
             </a:r>
           </a:p>
@@ -2996,7 +2991,7 @@
           <a:p>
             <a:pPr lvl="0"/>
             <a:r>
-              <a:rPr lang="en-US" smtClean="0"/>
+              <a:rPr lang="en-US"/>
               <a:t>Click to edit Master text styles</a:t>
             </a:r>
           </a:p>
@@ -3018,10 +3013,9 @@
           <a:lstStyle/>
           <a:p>
             <a:r>
-              <a:rPr lang="en-US" smtClean="0"/>
+              <a:rPr lang="en-US"/>
               <a:t>10/20/2010</a:t>
             </a:r>
-            <a:endParaRPr lang="en-US"/>
           </a:p>
         </p:txBody>
       </p:sp>
@@ -3209,7 +3203,7 @@
           <a:lstStyle/>
           <a:p>
             <a:r>
-              <a:rPr lang="en-US" smtClean="0"/>
+              <a:rPr lang="en-US"/>
               <a:t>Click to edit Master title style</a:t>
             </a:r>
             <a:endParaRPr lang="en-US" dirty="0"/>
@@ -3281,7 +3275,7 @@
           <a:p>
             <a:pPr lvl="0"/>
             <a:r>
-              <a:rPr lang="en-US" smtClean="0"/>
+              <a:rPr lang="en-US"/>
               <a:t>Click to edit Master text styles</a:t>
             </a:r>
           </a:p>
@@ -3359,7 +3353,7 @@
           </a:lstStyle>
           <a:p>
             <a:r>
-              <a:rPr lang="en-US" smtClean="0"/>
+              <a:rPr lang="en-US"/>
               <a:t>Click icon to add picture</a:t>
             </a:r>
             <a:endParaRPr lang="en-US" dirty="0"/>
@@ -3427,7 +3421,7 @@
           <a:p>
             <a:pPr lvl="0"/>
             <a:r>
-              <a:rPr lang="en-US" smtClean="0"/>
+              <a:rPr lang="en-US"/>
               <a:t>Click to edit Master text styles</a:t>
             </a:r>
           </a:p>
@@ -3498,7 +3492,7 @@
           <a:p>
             <a:pPr lvl="0"/>
             <a:r>
-              <a:rPr lang="en-US" smtClean="0"/>
+              <a:rPr lang="en-US"/>
               <a:t>Click to edit Master text styles</a:t>
             </a:r>
           </a:p>
@@ -3576,7 +3570,7 @@
           </a:lstStyle>
           <a:p>
             <a:r>
-              <a:rPr lang="en-US" smtClean="0"/>
+              <a:rPr lang="en-US"/>
               <a:t>Click icon to add picture</a:t>
             </a:r>
             <a:endParaRPr lang="en-US" dirty="0"/>
@@ -3644,7 +3638,7 @@
           <a:p>
             <a:pPr lvl="0"/>
             <a:r>
-              <a:rPr lang="en-US" smtClean="0"/>
+              <a:rPr lang="en-US"/>
               <a:t>Click to edit Master text styles</a:t>
             </a:r>
           </a:p>
@@ -3715,7 +3709,7 @@
           <a:p>
             <a:pPr lvl="0"/>
             <a:r>
-              <a:rPr lang="en-US" smtClean="0"/>
+              <a:rPr lang="en-US"/>
               <a:t>Click to edit Master text styles</a:t>
             </a:r>
           </a:p>
@@ -3793,7 +3787,7 @@
           </a:lstStyle>
           <a:p>
             <a:r>
-              <a:rPr lang="en-US" smtClean="0"/>
+              <a:rPr lang="en-US"/>
               <a:t>Click icon to add picture</a:t>
             </a:r>
             <a:endParaRPr lang="en-US" dirty="0"/>
@@ -3861,7 +3855,7 @@
           <a:p>
             <a:pPr lvl="0"/>
             <a:r>
-              <a:rPr lang="en-US" smtClean="0"/>
+              <a:rPr lang="en-US"/>
               <a:t>Click to edit Master text styles</a:t>
             </a:r>
           </a:p>
@@ -3883,10 +3877,9 @@
           <a:lstStyle/>
           <a:p>
             <a:r>
-              <a:rPr lang="en-US" smtClean="0"/>
+              <a:rPr lang="en-US"/>
               <a:t>10/20/2010</a:t>
             </a:r>
-            <a:endParaRPr lang="en-US"/>
           </a:p>
         </p:txBody>
       </p:sp>
@@ -3979,7 +3972,7 @@
           <a:lstStyle/>
           <a:p>
             <a:r>
-              <a:rPr lang="en-US" smtClean="0"/>
+              <a:rPr lang="en-US"/>
               <a:t>Click to edit Master title style</a:t>
             </a:r>
             <a:endParaRPr lang="en-US" dirty="0"/>
@@ -4003,35 +3996,35 @@
           <a:p>
             <a:pPr lvl="0"/>
             <a:r>
-              <a:rPr lang="en-US" smtClean="0"/>
+              <a:rPr lang="en-US"/>
               <a:t>Click to edit Master text styles</a:t>
             </a:r>
           </a:p>
           <a:p>
             <a:pPr lvl="1"/>
             <a:r>
-              <a:rPr lang="en-US" smtClean="0"/>
+              <a:rPr lang="en-US"/>
               <a:t>Second level</a:t>
             </a:r>
           </a:p>
           <a:p>
             <a:pPr lvl="2"/>
             <a:r>
-              <a:rPr lang="en-US" smtClean="0"/>
+              <a:rPr lang="en-US"/>
               <a:t>Third level</a:t>
             </a:r>
           </a:p>
           <a:p>
             <a:pPr lvl="3"/>
             <a:r>
-              <a:rPr lang="en-US" smtClean="0"/>
+              <a:rPr lang="en-US"/>
               <a:t>Fourth level</a:t>
             </a:r>
           </a:p>
           <a:p>
             <a:pPr lvl="4"/>
             <a:r>
-              <a:rPr lang="en-US" smtClean="0"/>
+              <a:rPr lang="en-US"/>
               <a:t>Fifth level</a:t>
             </a:r>
             <a:endParaRPr lang="en-US" dirty="0"/>
@@ -4054,10 +4047,9 @@
           <a:lstStyle/>
           <a:p>
             <a:r>
-              <a:rPr lang="en-US" smtClean="0"/>
+              <a:rPr lang="en-US"/>
               <a:t>10/20/2010</a:t>
             </a:r>
-            <a:endParaRPr lang="en-US"/>
           </a:p>
         </p:txBody>
       </p:sp>
@@ -4159,7 +4151,7 @@
           </a:lstStyle>
           <a:p>
             <a:r>
-              <a:rPr lang="en-US" smtClean="0"/>
+              <a:rPr lang="en-US"/>
               <a:t>Click to edit Master title style</a:t>
             </a:r>
             <a:endParaRPr lang="en-US" dirty="0"/>
@@ -4188,35 +4180,35 @@
           <a:p>
             <a:pPr lvl="0"/>
             <a:r>
-              <a:rPr lang="en-US" smtClean="0"/>
+              <a:rPr lang="en-US"/>
               <a:t>Click to edit Master text styles</a:t>
             </a:r>
           </a:p>
           <a:p>
             <a:pPr lvl="1"/>
             <a:r>
-              <a:rPr lang="en-US" smtClean="0"/>
+              <a:rPr lang="en-US"/>
               <a:t>Second level</a:t>
             </a:r>
           </a:p>
           <a:p>
             <a:pPr lvl="2"/>
             <a:r>
-              <a:rPr lang="en-US" smtClean="0"/>
+              <a:rPr lang="en-US"/>
               <a:t>Third level</a:t>
             </a:r>
           </a:p>
           <a:p>
             <a:pPr lvl="3"/>
             <a:r>
-              <a:rPr lang="en-US" smtClean="0"/>
+              <a:rPr lang="en-US"/>
               <a:t>Fourth level</a:t>
             </a:r>
           </a:p>
           <a:p>
             <a:pPr lvl="4"/>
             <a:r>
-              <a:rPr lang="en-US" smtClean="0"/>
+              <a:rPr lang="en-US"/>
               <a:t>Fifth level</a:t>
             </a:r>
             <a:endParaRPr lang="en-US" dirty="0"/>
@@ -4239,10 +4231,9 @@
           <a:lstStyle/>
           <a:p>
             <a:r>
-              <a:rPr lang="en-US" smtClean="0"/>
+              <a:rPr lang="en-US"/>
               <a:t>10/20/2010</a:t>
             </a:r>
-            <a:endParaRPr lang="en-US"/>
           </a:p>
         </p:txBody>
       </p:sp>
@@ -4335,7 +4326,7 @@
           <a:lstStyle/>
           <a:p>
             <a:r>
-              <a:rPr lang="en-US" smtClean="0"/>
+              <a:rPr lang="en-US"/>
               <a:t>Click to edit Master title style</a:t>
             </a:r>
             <a:endParaRPr lang="en-US" dirty="0"/>
@@ -4359,35 +4350,35 @@
           <a:p>
             <a:pPr lvl="0"/>
             <a:r>
-              <a:rPr lang="en-US" smtClean="0"/>
+              <a:rPr lang="en-US"/>
               <a:t>Click to edit Master text styles</a:t>
             </a:r>
           </a:p>
           <a:p>
             <a:pPr lvl="1"/>
             <a:r>
-              <a:rPr lang="en-US" smtClean="0"/>
+              <a:rPr lang="en-US"/>
               <a:t>Second level</a:t>
             </a:r>
           </a:p>
           <a:p>
             <a:pPr lvl="2"/>
             <a:r>
-              <a:rPr lang="en-US" smtClean="0"/>
+              <a:rPr lang="en-US"/>
               <a:t>Third level</a:t>
             </a:r>
           </a:p>
           <a:p>
             <a:pPr lvl="3"/>
             <a:r>
-              <a:rPr lang="en-US" smtClean="0"/>
+              <a:rPr lang="en-US"/>
               <a:t>Fourth level</a:t>
             </a:r>
           </a:p>
           <a:p>
             <a:pPr lvl="4"/>
             <a:r>
-              <a:rPr lang="en-US" smtClean="0"/>
+              <a:rPr lang="en-US"/>
               <a:t>Fifth level</a:t>
             </a:r>
             <a:endParaRPr lang="en-US" dirty="0"/>
@@ -4410,10 +4401,9 @@
           <a:lstStyle/>
           <a:p>
             <a:r>
-              <a:rPr lang="en-US" smtClean="0"/>
+              <a:rPr lang="en-US"/>
               <a:t>10/20/2010</a:t>
             </a:r>
-            <a:endParaRPr lang="en-US"/>
           </a:p>
         </p:txBody>
       </p:sp>
@@ -4515,7 +4505,7 @@
           </a:lstStyle>
           <a:p>
             <a:r>
-              <a:rPr lang="en-US" smtClean="0"/>
+              <a:rPr lang="en-US"/>
               <a:t>Click to edit Master title style</a:t>
             </a:r>
             <a:endParaRPr lang="en-US" dirty="0"/>
@@ -4633,7 +4623,7 @@
           <a:p>
             <a:pPr lvl="0"/>
             <a:r>
-              <a:rPr lang="en-US" smtClean="0"/>
+              <a:rPr lang="en-US"/>
               <a:t>Click to edit Master text styles</a:t>
             </a:r>
           </a:p>
@@ -4655,10 +4645,9 @@
           <a:lstStyle/>
           <a:p>
             <a:r>
-              <a:rPr lang="en-US" smtClean="0"/>
+              <a:rPr lang="en-US"/>
               <a:t>10/20/2010</a:t>
             </a:r>
-            <a:endParaRPr lang="en-US"/>
           </a:p>
         </p:txBody>
       </p:sp>
@@ -4751,7 +4740,7 @@
           <a:lstStyle/>
           <a:p>
             <a:r>
-              <a:rPr lang="en-US" smtClean="0"/>
+              <a:rPr lang="en-US"/>
               <a:t>Click to edit Master title style</a:t>
             </a:r>
             <a:endParaRPr lang="en-US" dirty="0"/>
@@ -4782,35 +4771,35 @@
           <a:p>
             <a:pPr lvl="0"/>
             <a:r>
-              <a:rPr lang="en-US" smtClean="0"/>
+              <a:rPr lang="en-US"/>
               <a:t>Click to edit Master text styles</a:t>
             </a:r>
           </a:p>
           <a:p>
             <a:pPr lvl="1"/>
             <a:r>
-              <a:rPr lang="en-US" smtClean="0"/>
+              <a:rPr lang="en-US"/>
               <a:t>Second level</a:t>
             </a:r>
           </a:p>
           <a:p>
             <a:pPr lvl="2"/>
             <a:r>
-              <a:rPr lang="en-US" smtClean="0"/>
+              <a:rPr lang="en-US"/>
               <a:t>Third level</a:t>
             </a:r>
           </a:p>
           <a:p>
             <a:pPr lvl="3"/>
             <a:r>
-              <a:rPr lang="en-US" smtClean="0"/>
+              <a:rPr lang="en-US"/>
               <a:t>Fourth level</a:t>
             </a:r>
           </a:p>
           <a:p>
             <a:pPr lvl="4"/>
             <a:r>
-              <a:rPr lang="en-US" smtClean="0"/>
+              <a:rPr lang="en-US"/>
               <a:t>Fifth level</a:t>
             </a:r>
             <a:endParaRPr lang="en-US" dirty="0"/>
@@ -4841,35 +4830,35 @@
           <a:p>
             <a:pPr lvl="0"/>
             <a:r>
-              <a:rPr lang="en-US" smtClean="0"/>
+              <a:rPr lang="en-US"/>
               <a:t>Click to edit Master text styles</a:t>
             </a:r>
           </a:p>
           <a:p>
             <a:pPr lvl="1"/>
             <a:r>
-              <a:rPr lang="en-US" smtClean="0"/>
+              <a:rPr lang="en-US"/>
               <a:t>Second level</a:t>
             </a:r>
           </a:p>
           <a:p>
             <a:pPr lvl="2"/>
             <a:r>
-              <a:rPr lang="en-US" smtClean="0"/>
+              <a:rPr lang="en-US"/>
               <a:t>Third level</a:t>
             </a:r>
           </a:p>
           <a:p>
             <a:pPr lvl="3"/>
             <a:r>
-              <a:rPr lang="en-US" smtClean="0"/>
+              <a:rPr lang="en-US"/>
               <a:t>Fourth level</a:t>
             </a:r>
           </a:p>
           <a:p>
             <a:pPr lvl="4"/>
             <a:r>
-              <a:rPr lang="en-US" smtClean="0"/>
+              <a:rPr lang="en-US"/>
               <a:t>Fifth level</a:t>
             </a:r>
             <a:endParaRPr lang="en-US" dirty="0"/>
@@ -4892,10 +4881,9 @@
           <a:lstStyle/>
           <a:p>
             <a:r>
-              <a:rPr lang="en-US" smtClean="0"/>
+              <a:rPr lang="en-US"/>
               <a:t>10/20/2010</a:t>
             </a:r>
-            <a:endParaRPr lang="en-US"/>
           </a:p>
         </p:txBody>
       </p:sp>
@@ -5052,7 +5040,7 @@
           </a:lstStyle>
           <a:p>
             <a:r>
-              <a:rPr lang="en-US" smtClean="0"/>
+              <a:rPr lang="en-US"/>
               <a:t>Click to edit Master title style</a:t>
             </a:r>
             <a:endParaRPr lang="en-US" dirty="0"/>
@@ -5120,7 +5108,7 @@
           <a:p>
             <a:pPr lvl="0"/>
             <a:r>
-              <a:rPr lang="en-US" smtClean="0"/>
+              <a:rPr lang="en-US"/>
               <a:t>Click to edit Master text styles</a:t>
             </a:r>
           </a:p>
@@ -5166,35 +5154,35 @@
           <a:p>
             <a:pPr lvl="0"/>
             <a:r>
-              <a:rPr lang="en-US" smtClean="0"/>
+              <a:rPr lang="en-US"/>
               <a:t>Click to edit Master text styles</a:t>
             </a:r>
           </a:p>
           <a:p>
             <a:pPr lvl="1"/>
             <a:r>
-              <a:rPr lang="en-US" smtClean="0"/>
+              <a:rPr lang="en-US"/>
               <a:t>Second level</a:t>
             </a:r>
           </a:p>
           <a:p>
             <a:pPr lvl="2"/>
             <a:r>
-              <a:rPr lang="en-US" smtClean="0"/>
+              <a:rPr lang="en-US"/>
               <a:t>Third level</a:t>
             </a:r>
           </a:p>
           <a:p>
             <a:pPr lvl="3"/>
             <a:r>
-              <a:rPr lang="en-US" smtClean="0"/>
+              <a:rPr lang="en-US"/>
               <a:t>Fourth level</a:t>
             </a:r>
           </a:p>
           <a:p>
             <a:pPr lvl="4"/>
             <a:r>
-              <a:rPr lang="en-US" smtClean="0"/>
+              <a:rPr lang="en-US"/>
               <a:t>Fifth level</a:t>
             </a:r>
             <a:endParaRPr lang="en-US" dirty="0"/>
@@ -5262,7 +5250,7 @@
           <a:p>
             <a:pPr lvl="0"/>
             <a:r>
-              <a:rPr lang="en-US" smtClean="0"/>
+              <a:rPr lang="en-US"/>
               <a:t>Click to edit Master text styles</a:t>
             </a:r>
           </a:p>
@@ -5308,35 +5296,35 @@
           <a:p>
             <a:pPr lvl="0"/>
             <a:r>
-              <a:rPr lang="en-US" smtClean="0"/>
+              <a:rPr lang="en-US"/>
               <a:t>Click to edit Master text styles</a:t>
             </a:r>
           </a:p>
           <a:p>
             <a:pPr lvl="1"/>
             <a:r>
-              <a:rPr lang="en-US" smtClean="0"/>
+              <a:rPr lang="en-US"/>
               <a:t>Second level</a:t>
             </a:r>
           </a:p>
           <a:p>
             <a:pPr lvl="2"/>
             <a:r>
-              <a:rPr lang="en-US" smtClean="0"/>
+              <a:rPr lang="en-US"/>
               <a:t>Third level</a:t>
             </a:r>
           </a:p>
           <a:p>
             <a:pPr lvl="3"/>
             <a:r>
-              <a:rPr lang="en-US" smtClean="0"/>
+              <a:rPr lang="en-US"/>
               <a:t>Fourth level</a:t>
             </a:r>
           </a:p>
           <a:p>
             <a:pPr lvl="4"/>
             <a:r>
-              <a:rPr lang="en-US" smtClean="0"/>
+              <a:rPr lang="en-US"/>
               <a:t>Fifth level</a:t>
             </a:r>
             <a:endParaRPr lang="en-US" dirty="0"/>
@@ -5359,10 +5347,9 @@
           <a:lstStyle/>
           <a:p>
             <a:r>
-              <a:rPr lang="en-US" smtClean="0"/>
+              <a:rPr lang="en-US"/>
               <a:t>10/20/2010</a:t>
             </a:r>
-            <a:endParaRPr lang="en-US"/>
           </a:p>
         </p:txBody>
       </p:sp>
@@ -5455,7 +5442,7 @@
           <a:lstStyle/>
           <a:p>
             <a:r>
-              <a:rPr lang="en-US" smtClean="0"/>
+              <a:rPr lang="en-US"/>
               <a:t>Click to edit Master title style</a:t>
             </a:r>
             <a:endParaRPr lang="en-US" dirty="0"/>
@@ -5478,10 +5465,9 @@
           <a:lstStyle/>
           <a:p>
             <a:r>
-              <a:rPr lang="en-US" smtClean="0"/>
+              <a:rPr lang="en-US"/>
               <a:t>10/20/2010</a:t>
             </a:r>
-            <a:endParaRPr lang="en-US"/>
           </a:p>
         </p:txBody>
       </p:sp>
@@ -5574,10 +5560,9 @@
           <a:lstStyle/>
           <a:p>
             <a:r>
-              <a:rPr lang="en-US" smtClean="0"/>
+              <a:rPr lang="en-US"/>
               <a:t>10/20/2010</a:t>
             </a:r>
-            <a:endParaRPr lang="en-US"/>
           </a:p>
         </p:txBody>
       </p:sp>
@@ -5681,7 +5666,7 @@
           </a:lstStyle>
           <a:p>
             <a:r>
-              <a:rPr lang="en-US" smtClean="0"/>
+              <a:rPr lang="en-US"/>
               <a:t>Click to edit Master title style</a:t>
             </a:r>
             <a:endParaRPr lang="en-US" dirty="0"/>
@@ -5712,35 +5697,35 @@
           <a:p>
             <a:pPr lvl="0"/>
             <a:r>
-              <a:rPr lang="en-US" smtClean="0"/>
+              <a:rPr lang="en-US"/>
               <a:t>Click to edit Master text styles</a:t>
             </a:r>
           </a:p>
           <a:p>
             <a:pPr lvl="1"/>
             <a:r>
-              <a:rPr lang="en-US" smtClean="0"/>
+              <a:rPr lang="en-US"/>
               <a:t>Second level</a:t>
             </a:r>
           </a:p>
           <a:p>
             <a:pPr lvl="2"/>
             <a:r>
-              <a:rPr lang="en-US" smtClean="0"/>
+              <a:rPr lang="en-US"/>
               <a:t>Third level</a:t>
             </a:r>
           </a:p>
           <a:p>
             <a:pPr lvl="3"/>
             <a:r>
-              <a:rPr lang="en-US" smtClean="0"/>
+              <a:rPr lang="en-US"/>
               <a:t>Fourth level</a:t>
             </a:r>
           </a:p>
           <a:p>
             <a:pPr lvl="4"/>
             <a:r>
-              <a:rPr lang="en-US" smtClean="0"/>
+              <a:rPr lang="en-US"/>
               <a:t>Fifth level</a:t>
             </a:r>
             <a:endParaRPr lang="en-US" dirty="0"/>
@@ -5808,7 +5793,7 @@
           <a:p>
             <a:pPr lvl="0"/>
             <a:r>
-              <a:rPr lang="en-US" smtClean="0"/>
+              <a:rPr lang="en-US"/>
               <a:t>Click to edit Master text styles</a:t>
             </a:r>
           </a:p>
@@ -5830,10 +5815,9 @@
           <a:lstStyle/>
           <a:p>
             <a:r>
-              <a:rPr lang="en-US" smtClean="0"/>
+              <a:rPr lang="en-US"/>
               <a:t>10/20/2010</a:t>
             </a:r>
-            <a:endParaRPr lang="en-US"/>
           </a:p>
         </p:txBody>
       </p:sp>
@@ -5967,7 +5951,7 @@
           </a:lstStyle>
           <a:p>
             <a:r>
-              <a:rPr lang="en-US" smtClean="0"/>
+              <a:rPr lang="en-US"/>
               <a:t>Click to edit Master title style</a:t>
             </a:r>
             <a:endParaRPr lang="en-US" dirty="0"/>
@@ -6041,7 +6025,7 @@
           </a:lstStyle>
           <a:p>
             <a:r>
-              <a:rPr lang="en-US" smtClean="0"/>
+              <a:rPr lang="en-US"/>
               <a:t>Click icon to add picture</a:t>
             </a:r>
             <a:endParaRPr lang="en-US" dirty="0"/>
@@ -6109,7 +6093,7 @@
           <a:p>
             <a:pPr lvl="0"/>
             <a:r>
-              <a:rPr lang="en-US" smtClean="0"/>
+              <a:rPr lang="en-US"/>
               <a:t>Click to edit Master text styles</a:t>
             </a:r>
           </a:p>
@@ -6131,10 +6115,9 @@
           <a:lstStyle/>
           <a:p>
             <a:r>
-              <a:rPr lang="en-US" smtClean="0"/>
+              <a:rPr lang="en-US"/>
               <a:t>10/20/2010</a:t>
             </a:r>
-            <a:endParaRPr lang="en-US"/>
           </a:p>
         </p:txBody>
       </p:sp>
@@ -6249,7 +6232,7 @@
           <a:lstStyle/>
           <a:p>
             <a:r>
-              <a:rPr lang="en-US" smtClean="0"/>
+              <a:rPr lang="en-US"/>
               <a:t>Click to edit Master title style</a:t>
             </a:r>
             <a:endParaRPr lang="en-US" dirty="0"/>
@@ -6290,35 +6273,35 @@
           <a:p>
             <a:pPr lvl="0"/>
             <a:r>
-              <a:rPr lang="en-US" smtClean="0"/>
+              <a:rPr lang="en-US"/>
               <a:t>Click to edit Master text styles</a:t>
             </a:r>
           </a:p>
           <a:p>
             <a:pPr lvl="1"/>
             <a:r>
-              <a:rPr lang="en-US" smtClean="0"/>
+              <a:rPr lang="en-US"/>
               <a:t>Second level</a:t>
             </a:r>
           </a:p>
           <a:p>
             <a:pPr lvl="2"/>
             <a:r>
-              <a:rPr lang="en-US" smtClean="0"/>
+              <a:rPr lang="en-US"/>
               <a:t>Third level</a:t>
             </a:r>
           </a:p>
           <a:p>
             <a:pPr lvl="3"/>
             <a:r>
-              <a:rPr lang="en-US" smtClean="0"/>
+              <a:rPr lang="en-US"/>
               <a:t>Fourth level</a:t>
             </a:r>
           </a:p>
           <a:p>
             <a:pPr lvl="4"/>
             <a:r>
-              <a:rPr lang="en-US" smtClean="0"/>
+              <a:rPr lang="en-US"/>
               <a:t>Fifth level</a:t>
             </a:r>
             <a:endParaRPr lang="en-US" dirty="0"/>
@@ -6366,10 +6349,9 @@
           </a:lstStyle>
           <a:p>
             <a:r>
-              <a:rPr lang="en-US" smtClean="0"/>
+              <a:rPr lang="en-US"/>
               <a:t>10/20/2010</a:t>
             </a:r>
-            <a:endParaRPr lang="en-US"/>
           </a:p>
         </p:txBody>
       </p:sp>
@@ -7059,17 +7041,16 @@
           <a:lstStyle/>
           <a:p>
             <a:r>
-              <a:rPr lang="en-US" dirty="0" smtClean="0"/>
+              <a:rPr lang="en-US" dirty="0"/>
               <a:t>CS4710: Artificial Intelligence</a:t>
             </a:r>
             <a:br>
-              <a:rPr lang="en-US" dirty="0" smtClean="0"/>
+              <a:rPr lang="en-US" dirty="0"/>
             </a:br>
             <a:r>
-              <a:rPr lang="en-US" dirty="0" smtClean="0"/>
+              <a:rPr lang="en-US" dirty="0"/>
               <a:t>Local Search</a:t>
             </a:r>
-            <a:endParaRPr lang="en-US" dirty="0"/>
           </a:p>
         </p:txBody>
       </p:sp>
@@ -7089,11 +7070,11 @@
           <a:lstStyle/>
           <a:p>
             <a:r>
-              <a:rPr lang="en-US" dirty="0" smtClean="0"/>
+              <a:rPr lang="en-US" dirty="0"/>
               <a:t>A different kind of search problem </a:t>
             </a:r>
             <a:r>
-              <a:rPr lang="en-US" dirty="0" smtClean="0">
+              <a:rPr lang="en-US" dirty="0">
                 <a:sym typeface="Wingdings" panose="05000000000000000000" pitchFamily="2" charset="2"/>
               </a:rPr>
               <a:t></a:t>
@@ -7112,13 +7093,6 @@
   <p:clrMapOvr>
     <a:masterClrMapping/>
   </p:clrMapOvr>
-  <p:timing>
-    <p:tnLst>
-      <p:par>
-        <p:cTn id="1" dur="indefinite" restart="never" nodeType="tmRoot"/>
-      </p:par>
-    </p:tnLst>
-  </p:timing>
 </p:sld>
 </file>
 
@@ -7155,10 +7129,9 @@
           <a:lstStyle/>
           <a:p>
             <a:r>
-              <a:rPr lang="en-US" dirty="0" smtClean="0"/>
+              <a:rPr lang="en-US" dirty="0"/>
               <a:t>Simulated Annealing</a:t>
             </a:r>
-            <a:endParaRPr lang="en-US" dirty="0"/>
           </a:p>
         </p:txBody>
       </p:sp>
@@ -7191,13 +7164,6 @@
   <p:clrMapOvr>
     <a:masterClrMapping/>
   </p:clrMapOvr>
-  <p:timing>
-    <p:tnLst>
-      <p:par>
-        <p:cTn id="1" dur="indefinite" restart="never" nodeType="tmRoot"/>
-      </p:par>
-    </p:tnLst>
-  </p:timing>
 </p:sld>
 </file>
 
@@ -7234,10 +7200,9 @@
           <a:lstStyle/>
           <a:p>
             <a:r>
-              <a:rPr lang="en-US" dirty="0" smtClean="0"/>
+              <a:rPr lang="en-US" dirty="0"/>
               <a:t>Annealing</a:t>
             </a:r>
-            <a:endParaRPr lang="en-US" dirty="0"/>
           </a:p>
         </p:txBody>
       </p:sp>
@@ -7257,7 +7222,7 @@
           <a:lstStyle/>
           <a:p>
             <a:r>
-              <a:rPr lang="en-US" dirty="0" smtClean="0"/>
+              <a:rPr lang="en-US" dirty="0"/>
               <a:t>Annealing is the process used to temper or harden metals and glass by heating them to a high temperature and then gradually cooling them, thus allowing the material to reach a low-energy crystalline state.</a:t>
             </a:r>
           </a:p>
@@ -7266,7 +7231,7 @@
           </a:p>
           <a:p>
             <a:r>
-              <a:rPr lang="en-US" dirty="0" smtClean="0"/>
+              <a:rPr lang="en-US" dirty="0"/>
               <a:t>Simulated annealing is just a search algorithm motivated by this idea.</a:t>
             </a:r>
           </a:p>
@@ -7309,13 +7274,6 @@
   <p:clrMapOvr>
     <a:masterClrMapping/>
   </p:clrMapOvr>
-  <p:timing>
-    <p:tnLst>
-      <p:par>
-        <p:cTn id="1" dur="indefinite" restart="never" nodeType="tmRoot"/>
-      </p:par>
-    </p:tnLst>
-  </p:timing>
 </p:sld>
 </file>
 
@@ -7352,10 +7310,9 @@
           <a:lstStyle/>
           <a:p>
             <a:r>
-              <a:rPr lang="en-US" dirty="0" smtClean="0"/>
+              <a:rPr lang="en-US" dirty="0"/>
               <a:t>Annealing</a:t>
             </a:r>
-            <a:endParaRPr lang="en-US" dirty="0"/>
           </a:p>
         </p:txBody>
       </p:sp>
@@ -7375,7 +7332,7 @@
           <a:lstStyle/>
           <a:p>
             <a:r>
-              <a:rPr lang="en-US" dirty="0" smtClean="0"/>
+              <a:rPr lang="en-US" dirty="0"/>
               <a:t>Idea!</a:t>
             </a:r>
           </a:p>
@@ -7384,7 +7341,7 @@
           </a:p>
           <a:p>
             <a:r>
-              <a:rPr lang="en-US" dirty="0" smtClean="0"/>
+              <a:rPr lang="en-US" dirty="0"/>
               <a:t>What if system has a ‘temperature‘</a:t>
             </a:r>
           </a:p>
@@ -7393,10 +7350,9 @@
           </a:p>
           <a:p>
             <a:r>
-              <a:rPr lang="en-US" dirty="0" smtClean="0"/>
+              <a:rPr lang="en-US" dirty="0"/>
               <a:t>At high temps, system explores much more, but at low temps, is more conservative (closer to hill-climbing)</a:t>
             </a:r>
-            <a:endParaRPr lang="en-US" dirty="0"/>
           </a:p>
         </p:txBody>
       </p:sp>
@@ -7434,13 +7390,6 @@
   <p:clrMapOvr>
     <a:masterClrMapping/>
   </p:clrMapOvr>
-  <p:timing>
-    <p:tnLst>
-      <p:par>
-        <p:cTn id="1" dur="indefinite" restart="never" nodeType="tmRoot"/>
-      </p:par>
-    </p:tnLst>
-  </p:timing>
 </p:sld>
 </file>
 
@@ -7477,10 +7426,9 @@
           <a:lstStyle/>
           <a:p>
             <a:r>
-              <a:rPr lang="en-US" dirty="0" smtClean="0"/>
+              <a:rPr lang="en-US" dirty="0"/>
               <a:t>Simulated Annealing</a:t>
             </a:r>
-            <a:endParaRPr lang="en-US" dirty="0"/>
           </a:p>
         </p:txBody>
       </p:sp>
@@ -7503,7 +7451,7 @@
               <a:buAutoNum type="arabicPeriod"/>
             </a:pPr>
             <a:r>
-              <a:rPr lang="en-US" dirty="0" smtClean="0"/>
+              <a:rPr lang="en-US" dirty="0"/>
               <a:t>Choose random initial state, high initial temperature, and cooling rate</a:t>
             </a:r>
           </a:p>
@@ -7512,7 +7460,7 @@
               <a:buAutoNum type="arabicPeriod"/>
             </a:pPr>
             <a:r>
-              <a:rPr lang="en-US" dirty="0" smtClean="0"/>
+              <a:rPr lang="en-US" dirty="0"/>
               <a:t>Choose random neighbor state</a:t>
             </a:r>
           </a:p>
@@ -7521,7 +7469,7 @@
               <a:buAutoNum type="arabicPeriod"/>
             </a:pPr>
             <a:r>
-              <a:rPr lang="en-US" dirty="0" smtClean="0"/>
+              <a:rPr lang="en-US" dirty="0"/>
               <a:t>Randomly decide whether to move to neighbor based on temperature</a:t>
             </a:r>
           </a:p>
@@ -7530,7 +7478,7 @@
               <a:buAutoNum type="arabicPeriod"/>
             </a:pPr>
             <a:r>
-              <a:rPr lang="en-US" dirty="0" smtClean="0"/>
+              <a:rPr lang="en-US" dirty="0"/>
               <a:t>Better neighbors have higher probability of being moved to. More detail later.</a:t>
             </a:r>
           </a:p>
@@ -7539,7 +7487,7 @@
               <a:buAutoNum type="arabicPeriod"/>
             </a:pPr>
             <a:r>
-              <a:rPr lang="en-US" dirty="0" smtClean="0"/>
+              <a:rPr lang="en-US" dirty="0"/>
               <a:t>Reduce temperature</a:t>
             </a:r>
           </a:p>
@@ -7548,10 +7496,9 @@
               <a:buAutoNum type="arabicPeriod"/>
             </a:pPr>
             <a:r>
-              <a:rPr lang="en-US" dirty="0" smtClean="0"/>
+              <a:rPr lang="en-US" dirty="0"/>
               <a:t>Repeat steps 2-5 until cooled</a:t>
             </a:r>
-            <a:endParaRPr lang="en-US" dirty="0"/>
           </a:p>
         </p:txBody>
       </p:sp>
@@ -7589,13 +7536,6 @@
   <p:clrMapOvr>
     <a:masterClrMapping/>
   </p:clrMapOvr>
-  <p:timing>
-    <p:tnLst>
-      <p:par>
-        <p:cTn id="1" dur="indefinite" restart="never" nodeType="tmRoot"/>
-      </p:par>
-    </p:tnLst>
-  </p:timing>
 </p:sld>
 </file>
 
@@ -7632,10 +7572,9 @@
           <a:lstStyle/>
           <a:p>
             <a:r>
-              <a:rPr lang="en-US" dirty="0" smtClean="0"/>
+              <a:rPr lang="en-US" dirty="0"/>
               <a:t>Simulated Annealing</a:t>
             </a:r>
-            <a:endParaRPr lang="en-US" dirty="0"/>
           </a:p>
         </p:txBody>
       </p:sp>
@@ -7673,13 +7612,6 @@
   <p:clrMapOvr>
     <a:masterClrMapping/>
   </p:clrMapOvr>
-  <p:timing>
-    <p:tnLst>
-      <p:par>
-        <p:cTn id="1" dur="indefinite" restart="never" nodeType="tmRoot"/>
-      </p:par>
-    </p:tnLst>
-  </p:timing>
 </p:sld>
 </file>
 
@@ -7716,10 +7648,9 @@
           <a:lstStyle/>
           <a:p>
             <a:r>
-              <a:rPr lang="en-US" dirty="0" smtClean="0"/>
+              <a:rPr lang="en-US" dirty="0"/>
               <a:t>Simulated Annealing</a:t>
             </a:r>
-            <a:endParaRPr lang="en-US" dirty="0"/>
           </a:p>
         </p:txBody>
       </p:sp>
@@ -7746,18 +7677,18 @@
           <a:lstStyle/>
           <a:p>
             <a:r>
-              <a:rPr lang="en-US" dirty="0" smtClean="0"/>
+              <a:rPr lang="en-US" dirty="0"/>
               <a:t>Example Animation (Wikipedia):</a:t>
             </a:r>
           </a:p>
           <a:p>
             <a:r>
-              <a:rPr lang="en-US" dirty="0" smtClean="0">
+              <a:rPr lang="en-US" dirty="0">
                 <a:hlinkClick r:id="rId2"/>
               </a:rPr>
               <a:t>Simulated Annealing In Action</a:t>
             </a:r>
-            <a:endParaRPr lang="en-US" dirty="0" smtClean="0"/>
+            <a:endParaRPr lang="en-US" dirty="0"/>
           </a:p>
         </p:txBody>
       </p:sp>
@@ -7771,13 +7702,6 @@
   <p:clrMapOvr>
     <a:masterClrMapping/>
   </p:clrMapOvr>
-  <p:timing>
-    <p:tnLst>
-      <p:par>
-        <p:cTn id="1" dur="indefinite" restart="never" nodeType="tmRoot"/>
-      </p:par>
-    </p:tnLst>
-  </p:timing>
 </p:sld>
 </file>
 
@@ -7814,10 +7738,9 @@
           <a:lstStyle/>
           <a:p>
             <a:r>
-              <a:rPr lang="en-US" dirty="0" smtClean="0"/>
+              <a:rPr lang="en-US" dirty="0"/>
               <a:t>Simulated Annealing: Probability Function</a:t>
             </a:r>
-            <a:endParaRPr lang="en-US" dirty="0"/>
           </a:p>
         </p:txBody>
       </p:sp>
@@ -7844,41 +7767,41 @@
           <a:lstStyle/>
           <a:p>
             <a:r>
-              <a:rPr lang="en-US" dirty="0" smtClean="0"/>
+              <a:rPr lang="en-US" dirty="0"/>
               <a:t>Requirements:</a:t>
             </a:r>
           </a:p>
           <a:p>
             <a:pPr marL="871200" lvl="1" indent="-457200"/>
-            <a:endParaRPr lang="en-US" dirty="0" smtClean="0"/>
+            <a:endParaRPr lang="en-US" dirty="0"/>
           </a:p>
           <a:p>
             <a:pPr marL="871200" lvl="1" indent="-457200"/>
             <a:r>
-              <a:rPr lang="en-US" dirty="0" smtClean="0"/>
+              <a:rPr lang="en-US" dirty="0"/>
               <a:t>Needs to be a function of ΔE where:</a:t>
             </a:r>
           </a:p>
           <a:p>
             <a:pPr marL="1177200" lvl="2" indent="-457200"/>
             <a:r>
-              <a:rPr lang="en-US" dirty="0" smtClean="0"/>
+              <a:rPr lang="en-US" dirty="0"/>
               <a:t>ΔE = Val(</a:t>
             </a:r>
             <a:r>
-              <a:rPr lang="en-US" dirty="0" err="1" smtClean="0"/>
+              <a:rPr lang="en-US" dirty="0" err="1"/>
               <a:t>newState</a:t>
             </a:r>
             <a:r>
-              <a:rPr lang="en-US" dirty="0" smtClean="0"/>
+              <a:rPr lang="en-US" dirty="0"/>
               <a:t>) – Val(</a:t>
             </a:r>
             <a:r>
-              <a:rPr lang="en-US" dirty="0" err="1" smtClean="0"/>
+              <a:rPr lang="en-US" dirty="0" err="1"/>
               <a:t>curState</a:t>
             </a:r>
             <a:r>
-              <a:rPr lang="en-US" dirty="0" smtClean="0"/>
+              <a:rPr lang="en-US" dirty="0"/>
               <a:t>)</a:t>
             </a:r>
           </a:p>
@@ -7896,21 +7819,21 @@
           <a:p>
             <a:pPr marL="871200" lvl="1" indent="-457200"/>
             <a:r>
-              <a:rPr lang="en-US" dirty="0" smtClean="0"/>
+              <a:rPr lang="en-US" dirty="0"/>
               <a:t>Needs to be a function of the temperature, which starts high and cools over time.</a:t>
             </a:r>
           </a:p>
           <a:p>
             <a:pPr marL="1177200" lvl="2" indent="-457200"/>
             <a:r>
-              <a:rPr lang="en-US" dirty="0" smtClean="0"/>
+              <a:rPr lang="en-US" dirty="0"/>
               <a:t>More likely to move to a worse state at higher temperatures.</a:t>
             </a:r>
           </a:p>
           <a:p>
             <a:pPr marL="1177200" lvl="2" indent="-457200"/>
             <a:r>
-              <a:rPr lang="en-US" dirty="0" smtClean="0"/>
+              <a:rPr lang="en-US" dirty="0"/>
               <a:t>As temp cools, becomes more conservative</a:t>
             </a:r>
           </a:p>
@@ -7954,13 +7877,6 @@
   <p:clrMapOvr>
     <a:masterClrMapping/>
   </p:clrMapOvr>
-  <p:timing>
-    <p:tnLst>
-      <p:par>
-        <p:cTn id="1" dur="indefinite" restart="never" nodeType="tmRoot"/>
-      </p:par>
-    </p:tnLst>
-  </p:timing>
 </p:sld>
 </file>
 
@@ -7997,10 +7913,9 @@
           <a:lstStyle/>
           <a:p>
             <a:r>
-              <a:rPr lang="en-US" dirty="0" smtClean="0"/>
+              <a:rPr lang="en-US" dirty="0"/>
               <a:t>Simulated Annealing: Sigmoid Function</a:t>
             </a:r>
-            <a:endParaRPr lang="en-US" dirty="0"/>
           </a:p>
         </p:txBody>
       </p:sp>
@@ -8027,20 +7942,20 @@
           <a:lstStyle/>
           <a:p>
             <a:pPr marL="494100" indent="-457200"/>
-            <a:endParaRPr lang="en-US" sz="3800" dirty="0" smtClean="0"/>
+            <a:endParaRPr lang="en-US" sz="3800" dirty="0"/>
           </a:p>
           <a:p>
             <a:pPr marL="494100" indent="-457200"/>
             <a:r>
-              <a:rPr lang="en-US" sz="3800" dirty="0" smtClean="0"/>
+              <a:rPr lang="en-US" sz="3800" dirty="0"/>
               <a:t>Y = 1 / (1 + e</a:t>
             </a:r>
             <a:r>
-              <a:rPr lang="en-US" sz="3800" baseline="30000" dirty="0" smtClean="0"/>
+              <a:rPr lang="en-US" sz="3800" baseline="30000" dirty="0"/>
               <a:t>-X</a:t>
             </a:r>
             <a:r>
-              <a:rPr lang="en-US" sz="3800" dirty="0" smtClean="0"/>
+              <a:rPr lang="en-US" sz="3800" dirty="0"/>
               <a:t>)</a:t>
             </a:r>
           </a:p>
@@ -8051,17 +7966,16 @@
           <a:p>
             <a:pPr marL="494100" indent="-457200"/>
             <a:r>
-              <a:rPr lang="en-US" sz="3800" dirty="0" smtClean="0"/>
+              <a:rPr lang="en-US" sz="3800" dirty="0"/>
               <a:t>First attempt:</a:t>
             </a:r>
           </a:p>
           <a:p>
             <a:pPr marL="871200" lvl="1" indent="-457200"/>
             <a:r>
-              <a:rPr lang="en-US" sz="3600" dirty="0" smtClean="0"/>
+              <a:rPr lang="en-US" sz="3600" dirty="0"/>
               <a:t>X = ΔE</a:t>
             </a:r>
-            <a:endParaRPr lang="en-US" sz="3600" dirty="0"/>
           </a:p>
         </p:txBody>
       </p:sp>
@@ -8116,13 +8030,6 @@
   <p:clrMapOvr>
     <a:masterClrMapping/>
   </p:clrMapOvr>
-  <p:timing>
-    <p:tnLst>
-      <p:par>
-        <p:cTn id="1" dur="indefinite" restart="never" nodeType="tmRoot"/>
-      </p:par>
-    </p:tnLst>
-  </p:timing>
 </p:sld>
 </file>
 
@@ -8159,10 +8066,9 @@
           <a:lstStyle/>
           <a:p>
             <a:r>
-              <a:rPr lang="en-US" dirty="0" smtClean="0"/>
+              <a:rPr lang="en-US" dirty="0"/>
               <a:t>Simulated Annealing: Sigmoid Function</a:t>
             </a:r>
-            <a:endParaRPr lang="en-US" dirty="0"/>
           </a:p>
         </p:txBody>
       </p:sp>
@@ -8189,20 +8095,20 @@
           <a:lstStyle/>
           <a:p>
             <a:pPr marL="494100" indent="-457200"/>
-            <a:endParaRPr lang="en-US" sz="3800" dirty="0" smtClean="0"/>
+            <a:endParaRPr lang="en-US" sz="3800" dirty="0"/>
           </a:p>
           <a:p>
             <a:pPr marL="494100" indent="-457200"/>
             <a:r>
-              <a:rPr lang="en-US" sz="3800" dirty="0" smtClean="0"/>
+              <a:rPr lang="en-US" sz="3800" dirty="0"/>
               <a:t>Y = 1 / (1 + e</a:t>
             </a:r>
             <a:r>
-              <a:rPr lang="en-US" sz="3800" baseline="30000" dirty="0" smtClean="0"/>
+              <a:rPr lang="en-US" sz="3800" baseline="30000" dirty="0"/>
               <a:t>-X</a:t>
             </a:r>
             <a:r>
-              <a:rPr lang="en-US" sz="3800" dirty="0" smtClean="0"/>
+              <a:rPr lang="en-US" sz="3800" dirty="0"/>
               <a:t>)</a:t>
             </a:r>
           </a:p>
@@ -8213,17 +8119,16 @@
           <a:p>
             <a:pPr marL="494100" indent="-457200"/>
             <a:r>
-              <a:rPr lang="en-US" sz="3800" dirty="0" smtClean="0"/>
+              <a:rPr lang="en-US" sz="3800" dirty="0"/>
               <a:t>Second attempt:</a:t>
             </a:r>
           </a:p>
           <a:p>
             <a:pPr marL="871200" lvl="1" indent="-457200"/>
             <a:r>
-              <a:rPr lang="en-US" sz="3600" dirty="0" smtClean="0"/>
+              <a:rPr lang="en-US" sz="3600" dirty="0"/>
               <a:t>X = ΔE / T</a:t>
             </a:r>
-            <a:endParaRPr lang="en-US" sz="3600" dirty="0"/>
           </a:p>
         </p:txBody>
       </p:sp>
@@ -8278,13 +8183,6 @@
   <p:clrMapOvr>
     <a:masterClrMapping/>
   </p:clrMapOvr>
-  <p:timing>
-    <p:tnLst>
-      <p:par>
-        <p:cTn id="1" dur="indefinite" restart="never" nodeType="tmRoot"/>
-      </p:par>
-    </p:tnLst>
-  </p:timing>
 </p:sld>
 </file>
 
@@ -8321,10 +8219,9 @@
           <a:lstStyle/>
           <a:p>
             <a:r>
-              <a:rPr lang="en-US" dirty="0" smtClean="0"/>
+              <a:rPr lang="en-US" dirty="0"/>
               <a:t>Simulated Annealing: Sigmoid Function</a:t>
             </a:r>
-            <a:endParaRPr lang="en-US" dirty="0"/>
           </a:p>
         </p:txBody>
       </p:sp>
@@ -8352,15 +8249,15 @@
           <a:p>
             <a:pPr marL="494100" indent="-457200"/>
             <a:r>
-              <a:rPr lang="en-US" sz="3800" dirty="0" smtClean="0"/>
+              <a:rPr lang="en-US" sz="3800" dirty="0"/>
               <a:t>Y = 1 / (1 + e</a:t>
             </a:r>
             <a:r>
-              <a:rPr lang="en-US" sz="3800" baseline="30000" dirty="0" smtClean="0"/>
+              <a:rPr lang="en-US" sz="3800" baseline="30000" dirty="0"/>
               <a:t>-X</a:t>
             </a:r>
             <a:r>
-              <a:rPr lang="en-US" sz="3800" dirty="0" smtClean="0"/>
+              <a:rPr lang="en-US" sz="3800" dirty="0"/>
               <a:t>)</a:t>
             </a:r>
           </a:p>
@@ -8371,7 +8268,7 @@
           <a:p>
             <a:pPr marL="494100" indent="-457200"/>
             <a:r>
-              <a:rPr lang="en-US" sz="3800" dirty="0" smtClean="0"/>
+              <a:rPr lang="en-US" sz="3800" dirty="0"/>
               <a:t>X = ΔE / T</a:t>
             </a:r>
           </a:p>
@@ -8382,25 +8279,16 @@
           <a:p>
             <a:pPr marL="494100" indent="-457200"/>
             <a:r>
-              <a:rPr lang="en-US" sz="3800" dirty="0" smtClean="0"/>
-              <a:t>How does ΔE </a:t>
-            </a:r>
-            <a:r>
               <a:rPr lang="en-US" sz="3800" dirty="0"/>
-              <a:t>a</a:t>
-            </a:r>
-            <a:r>
-              <a:rPr lang="en-US" sz="3800" dirty="0" smtClean="0"/>
-              <a:t>ffect P?</a:t>
+              <a:t>How does ΔE affect P?</a:t>
             </a:r>
           </a:p>
           <a:p>
             <a:pPr marL="494100" indent="-457200"/>
             <a:r>
-              <a:rPr lang="en-US" sz="3800" dirty="0" smtClean="0"/>
+              <a:rPr lang="en-US" sz="3800" dirty="0"/>
               <a:t>How does T affect P?</a:t>
             </a:r>
-            <a:endParaRPr lang="en-US" sz="3800" dirty="0"/>
           </a:p>
         </p:txBody>
       </p:sp>
@@ -8455,13 +8343,6 @@
   <p:clrMapOvr>
     <a:masterClrMapping/>
   </p:clrMapOvr>
-  <p:timing>
-    <p:tnLst>
-      <p:par>
-        <p:cTn id="1" dur="indefinite" restart="never" nodeType="tmRoot"/>
-      </p:par>
-    </p:tnLst>
-  </p:timing>
 </p:sld>
 </file>
 
@@ -8499,7 +8380,7 @@
           <a:p>
             <a:pPr eaLnBrk="1" hangingPunct="1"/>
             <a:r>
-              <a:rPr lang="en-US" dirty="0" smtClean="0"/>
+              <a:rPr lang="en-US" dirty="0"/>
               <a:t>Classical Search Vs. Local Search</a:t>
             </a:r>
           </a:p>
@@ -8531,7 +8412,7 @@
               <a:buNone/>
             </a:pPr>
             <a:r>
-              <a:rPr lang="en-US" dirty="0" smtClean="0"/>
+              <a:rPr lang="en-US" dirty="0"/>
               <a:t>Classical Search</a:t>
             </a:r>
           </a:p>
@@ -8542,7 +8423,7 @@
           <a:p>
             <a:pPr eaLnBrk="1" hangingPunct="1"/>
             <a:r>
-              <a:rPr lang="en-US" dirty="0" smtClean="0"/>
+              <a:rPr lang="en-US" dirty="0"/>
               <a:t>Observable</a:t>
             </a:r>
           </a:p>
@@ -8553,7 +8434,7 @@
           <a:p>
             <a:pPr eaLnBrk="1" hangingPunct="1"/>
             <a:r>
-              <a:rPr lang="en-US" dirty="0" smtClean="0"/>
+              <a:rPr lang="en-US" dirty="0"/>
               <a:t>Deterministic</a:t>
             </a:r>
           </a:p>
@@ -8564,24 +8445,24 @@
           <a:p>
             <a:pPr eaLnBrk="1" hangingPunct="1"/>
             <a:r>
-              <a:rPr lang="en-US" dirty="0" smtClean="0"/>
+              <a:rPr lang="en-US" dirty="0"/>
               <a:t>Known Environment</a:t>
             </a:r>
           </a:p>
           <a:p>
             <a:pPr eaLnBrk="1" hangingPunct="1"/>
-            <a:endParaRPr lang="en-US" dirty="0" smtClean="0"/>
+            <a:endParaRPr lang="en-US" dirty="0"/>
           </a:p>
           <a:p>
             <a:pPr eaLnBrk="1" hangingPunct="1"/>
             <a:r>
-              <a:rPr lang="en-US" dirty="0" smtClean="0"/>
+              <a:rPr lang="en-US" dirty="0"/>
               <a:t>Solution of sequence of actions</a:t>
             </a:r>
           </a:p>
           <a:p>
             <a:pPr eaLnBrk="1" hangingPunct="1"/>
-            <a:endParaRPr lang="en-US" dirty="0" smtClean="0"/>
+            <a:endParaRPr lang="en-US" dirty="0"/>
           </a:p>
         </p:txBody>
       </p:sp>
@@ -8611,7 +8492,7 @@
               <a:buNone/>
             </a:pPr>
             <a:r>
-              <a:rPr lang="en-US" sz="2400" dirty="0" smtClean="0"/>
+              <a:rPr lang="en-US" sz="2400" dirty="0"/>
               <a:t>Local Search</a:t>
             </a:r>
           </a:p>
@@ -8622,20 +8503,8 @@
           <a:p>
             <a:pPr eaLnBrk="1" hangingPunct="1"/>
             <a:r>
-              <a:rPr lang="en-US" sz="2400" dirty="0" smtClean="0"/>
+              <a:rPr lang="en-US" sz="2400" dirty="0"/>
               <a:t>All that matters is the solution state</a:t>
-            </a:r>
-            <a:endParaRPr lang="en-US" sz="2400" dirty="0"/>
-          </a:p>
-          <a:p>
-            <a:pPr eaLnBrk="1" hangingPunct="1"/>
-            <a:endParaRPr lang="en-US" sz="2400" dirty="0" smtClean="0"/>
-          </a:p>
-          <a:p>
-            <a:pPr eaLnBrk="1" hangingPunct="1"/>
-            <a:r>
-              <a:rPr lang="en-US" sz="2400" dirty="0" smtClean="0"/>
-              <a:t>Don’t care about solution path</a:t>
             </a:r>
           </a:p>
           <a:p>
@@ -8645,8 +8514,8 @@
           <a:p>
             <a:pPr eaLnBrk="1" hangingPunct="1"/>
             <a:r>
-              <a:rPr lang="en-US" sz="2400" dirty="0" smtClean="0"/>
-              <a:t>Impossible to search whole space (too large)</a:t>
+              <a:rPr lang="en-US" sz="2400" dirty="0"/>
+              <a:t>Don’t care about solution path</a:t>
             </a:r>
           </a:p>
           <a:p>
@@ -8656,10 +8525,20 @@
           <a:p>
             <a:pPr eaLnBrk="1" hangingPunct="1"/>
             <a:r>
-              <a:rPr lang="en-US" sz="2400" dirty="0" smtClean="0"/>
+              <a:rPr lang="en-US" sz="2400" dirty="0"/>
+              <a:t>Impossible to search whole space (too large)</a:t>
+            </a:r>
+          </a:p>
+          <a:p>
+            <a:pPr eaLnBrk="1" hangingPunct="1"/>
+            <a:endParaRPr lang="en-US" sz="2400" dirty="0"/>
+          </a:p>
+          <a:p>
+            <a:pPr eaLnBrk="1" hangingPunct="1"/>
+            <a:r>
+              <a:rPr lang="en-US" sz="2400" dirty="0"/>
               <a:t>Often continuous search space</a:t>
             </a:r>
-            <a:endParaRPr lang="en-US" sz="2400" dirty="0"/>
           </a:p>
         </p:txBody>
       </p:sp>
@@ -8673,13 +8552,6 @@
   <p:clrMapOvr>
     <a:masterClrMapping/>
   </p:clrMapOvr>
-  <p:timing>
-    <p:tnLst>
-      <p:par>
-        <p:cTn id="1" dur="indefinite" restart="never" nodeType="tmRoot"/>
-      </p:par>
-    </p:tnLst>
-  </p:timing>
 </p:sld>
 </file>
 
@@ -8716,10 +8588,9 @@
           <a:lstStyle/>
           <a:p>
             <a:r>
-              <a:rPr lang="en-US" dirty="0" smtClean="0"/>
+              <a:rPr lang="en-US" dirty="0"/>
               <a:t>Simulated Annealing</a:t>
             </a:r>
-            <a:endParaRPr lang="en-US" dirty="0"/>
           </a:p>
         </p:txBody>
       </p:sp>
@@ -8757,13 +8628,6 @@
   <p:clrMapOvr>
     <a:masterClrMapping/>
   </p:clrMapOvr>
-  <p:timing>
-    <p:tnLst>
-      <p:par>
-        <p:cTn id="1" dur="indefinite" restart="never" nodeType="tmRoot"/>
-      </p:par>
-    </p:tnLst>
-  </p:timing>
 </p:sld>
 </file>
 
@@ -8800,10 +8664,9 @@
           <a:lstStyle/>
           <a:p>
             <a:r>
-              <a:rPr lang="en-US" dirty="0" smtClean="0"/>
+              <a:rPr lang="en-US" dirty="0"/>
               <a:t>Choosing a Cooling Rate</a:t>
             </a:r>
-            <a:endParaRPr lang="en-US" dirty="0"/>
           </a:p>
         </p:txBody>
       </p:sp>
@@ -8823,7 +8686,7 @@
           <a:lstStyle/>
           <a:p>
             <a:r>
-              <a:rPr lang="en-US" dirty="0" smtClean="0"/>
+              <a:rPr lang="en-US" dirty="0"/>
               <a:t>No silver bullet</a:t>
             </a:r>
           </a:p>
@@ -8832,10 +8695,9 @@
           </a:p>
           <a:p>
             <a:r>
-              <a:rPr lang="en-US" dirty="0" smtClean="0"/>
+              <a:rPr lang="en-US" dirty="0"/>
               <a:t>Generally, high temperature and low cooling rate are best</a:t>
             </a:r>
-            <a:endParaRPr lang="en-US" dirty="0"/>
           </a:p>
         </p:txBody>
       </p:sp>
@@ -8873,13 +8735,6 @@
   <p:clrMapOvr>
     <a:masterClrMapping/>
   </p:clrMapOvr>
-  <p:timing>
-    <p:tnLst>
-      <p:par>
-        <p:cTn id="1" dur="indefinite" restart="never" nodeType="tmRoot"/>
-      </p:par>
-    </p:tnLst>
-  </p:timing>
 </p:sld>
 </file>
 
@@ -8916,10 +8771,9 @@
           <a:lstStyle/>
           <a:p>
             <a:r>
-              <a:rPr lang="en-US" dirty="0" smtClean="0"/>
+              <a:rPr lang="en-US" dirty="0"/>
               <a:t>Simulated Annealing: Advantages</a:t>
             </a:r>
-            <a:endParaRPr lang="en-US" dirty="0"/>
           </a:p>
         </p:txBody>
       </p:sp>
@@ -8939,7 +8793,7 @@
           <a:lstStyle/>
           <a:p>
             <a:r>
-              <a:rPr lang="en-US" dirty="0" smtClean="0"/>
+              <a:rPr lang="en-US" dirty="0"/>
               <a:t>Can deal with arbitrary systems and cost functions</a:t>
             </a:r>
           </a:p>
@@ -8948,7 +8802,7 @@
           </a:p>
           <a:p>
             <a:r>
-              <a:rPr lang="en-US" dirty="0" smtClean="0"/>
+              <a:rPr lang="en-US" dirty="0"/>
               <a:t>Is relatively easy to code, even for complex problems</a:t>
             </a:r>
           </a:p>
@@ -8957,7 +8811,7 @@
           </a:p>
           <a:p>
             <a:r>
-              <a:rPr lang="en-US" dirty="0" smtClean="0"/>
+              <a:rPr lang="en-US" dirty="0"/>
               <a:t>Generally gives good solutions</a:t>
             </a:r>
           </a:p>
@@ -8966,10 +8820,9 @@
           </a:p>
           <a:p>
             <a:r>
-              <a:rPr lang="en-US" dirty="0" smtClean="0"/>
+              <a:rPr lang="en-US" dirty="0"/>
               <a:t>Optimal? No! But often will return optimal solution in practice</a:t>
             </a:r>
-            <a:endParaRPr lang="en-US" dirty="0"/>
           </a:p>
         </p:txBody>
       </p:sp>
@@ -9007,13 +8860,6 @@
   <p:clrMapOvr>
     <a:masterClrMapping/>
   </p:clrMapOvr>
-  <p:timing>
-    <p:tnLst>
-      <p:par>
-        <p:cTn id="1" dur="indefinite" restart="never" nodeType="tmRoot"/>
-      </p:par>
-    </p:tnLst>
-  </p:timing>
 </p:sld>
 </file>
 
@@ -9050,10 +8896,9 @@
           <a:lstStyle/>
           <a:p>
             <a:r>
-              <a:rPr lang="en-US" dirty="0" smtClean="0"/>
+              <a:rPr lang="en-US" dirty="0"/>
               <a:t>Simulated Annealing: Complexity</a:t>
             </a:r>
-            <a:endParaRPr lang="en-US" dirty="0"/>
           </a:p>
         </p:txBody>
       </p:sp>
@@ -9073,14 +8918,14 @@
           <a:lstStyle/>
           <a:p>
             <a:r>
-              <a:rPr lang="en-US" dirty="0" smtClean="0"/>
+              <a:rPr lang="en-US" dirty="0"/>
               <a:t>O(1) Time</a:t>
             </a:r>
           </a:p>
           <a:p>
             <a:pPr lvl="1"/>
             <a:r>
-              <a:rPr lang="en-US" dirty="0" smtClean="0"/>
+              <a:rPr lang="en-US" dirty="0"/>
               <a:t>Why?</a:t>
             </a:r>
           </a:p>
@@ -9090,17 +8935,16 @@
           </a:p>
           <a:p>
             <a:r>
-              <a:rPr lang="en-US" dirty="0" smtClean="0"/>
+              <a:rPr lang="en-US" dirty="0"/>
               <a:t>O(1) Space</a:t>
             </a:r>
           </a:p>
           <a:p>
             <a:pPr lvl="1"/>
             <a:r>
-              <a:rPr lang="en-US" dirty="0" smtClean="0"/>
+              <a:rPr lang="en-US" dirty="0"/>
               <a:t>Why?</a:t>
             </a:r>
-            <a:endParaRPr lang="en-US" dirty="0"/>
           </a:p>
         </p:txBody>
       </p:sp>
@@ -9138,13 +8982,6 @@
   <p:clrMapOvr>
     <a:masterClrMapping/>
   </p:clrMapOvr>
-  <p:timing>
-    <p:tnLst>
-      <p:par>
-        <p:cTn id="1" dur="indefinite" restart="never" nodeType="tmRoot"/>
-      </p:par>
-    </p:tnLst>
-  </p:timing>
 </p:sld>
 </file>
 
@@ -9181,10 +9018,9 @@
           <a:lstStyle/>
           <a:p>
             <a:r>
-              <a:rPr lang="en-US" dirty="0" smtClean="0"/>
+              <a:rPr lang="en-US" dirty="0"/>
               <a:t>Simulated Annealing: TSP</a:t>
             </a:r>
-            <a:endParaRPr lang="en-US" dirty="0"/>
           </a:p>
         </p:txBody>
       </p:sp>
@@ -9204,7 +9040,7 @@
           <a:lstStyle/>
           <a:p>
             <a:r>
-              <a:rPr lang="en-US" dirty="0" smtClean="0"/>
+              <a:rPr lang="en-US" dirty="0"/>
               <a:t>We all know the Traveling Salesperson Problem. </a:t>
             </a:r>
           </a:p>
@@ -9213,7 +9049,7 @@
           </a:p>
           <a:p>
             <a:r>
-              <a:rPr lang="en-US" dirty="0" smtClean="0"/>
+              <a:rPr lang="en-US" dirty="0"/>
               <a:t>This problem is NP-Complete</a:t>
             </a:r>
           </a:p>
@@ -9222,7 +9058,7 @@
           </a:p>
           <a:p>
             <a:r>
-              <a:rPr lang="en-US" dirty="0" smtClean="0"/>
+              <a:rPr lang="en-US" dirty="0"/>
               <a:t>…but we can use SA to find very good solutions (not always optimal though).</a:t>
             </a:r>
           </a:p>
@@ -9231,10 +9067,9 @@
           </a:p>
           <a:p>
             <a:r>
-              <a:rPr lang="en-US" dirty="0" smtClean="0"/>
+              <a:rPr lang="en-US" dirty="0"/>
               <a:t>How would we do this?</a:t>
             </a:r>
-            <a:endParaRPr lang="en-US" dirty="0"/>
           </a:p>
         </p:txBody>
       </p:sp>
@@ -9289,13 +9124,6 @@
   <p:clrMapOvr>
     <a:masterClrMapping/>
   </p:clrMapOvr>
-  <p:timing>
-    <p:tnLst>
-      <p:par>
-        <p:cTn id="1" dur="indefinite" restart="never" nodeType="tmRoot"/>
-      </p:par>
-    </p:tnLst>
-  </p:timing>
 </p:sld>
 </file>
 
@@ -9332,10 +9160,9 @@
           <a:lstStyle/>
           <a:p>
             <a:r>
-              <a:rPr lang="en-US" dirty="0" smtClean="0"/>
+              <a:rPr lang="en-US" dirty="0"/>
               <a:t>Simulated Annealing: TSP</a:t>
             </a:r>
-            <a:endParaRPr lang="en-US" dirty="0"/>
           </a:p>
         </p:txBody>
       </p:sp>
@@ -9360,44 +9187,44 @@
           <a:lstStyle/>
           <a:p>
             <a:r>
-              <a:rPr lang="en-US" dirty="0" smtClean="0"/>
+              <a:rPr lang="en-US" dirty="0"/>
               <a:t>Choose a random tour (i.e., a random order for the cities)</a:t>
             </a:r>
           </a:p>
           <a:p>
             <a:r>
-              <a:rPr lang="en-US" dirty="0" smtClean="0"/>
+              <a:rPr lang="en-US" dirty="0"/>
               <a:t>Pick a new candidate tour by finding a random neighbor tour (how to find this?)</a:t>
             </a:r>
           </a:p>
           <a:p>
             <a:r>
-              <a:rPr lang="en-US" dirty="0" smtClean="0"/>
+              <a:rPr lang="en-US" dirty="0"/>
               <a:t>Use sigmoid function to determine if you will follow that path or not</a:t>
             </a:r>
           </a:p>
           <a:p>
             <a:pPr lvl="1"/>
             <a:r>
-              <a:rPr lang="en-US" dirty="0" smtClean="0"/>
+              <a:rPr lang="en-US" dirty="0"/>
               <a:t>Function of temperature and difference in costs of tours</a:t>
             </a:r>
           </a:p>
           <a:p>
             <a:r>
-              <a:rPr lang="en-US" dirty="0" smtClean="0"/>
+              <a:rPr lang="en-US" dirty="0"/>
               <a:t>Keep track of best tour seen so far</a:t>
             </a:r>
           </a:p>
           <a:p>
             <a:r>
-              <a:rPr lang="en-US" dirty="0" smtClean="0"/>
+              <a:rPr lang="en-US" dirty="0"/>
               <a:t>Cool the temperature a bit</a:t>
             </a:r>
           </a:p>
           <a:p>
             <a:r>
-              <a:rPr lang="en-US" dirty="0" smtClean="0"/>
+              <a:rPr lang="en-US" dirty="0"/>
               <a:t>Repeat</a:t>
             </a:r>
           </a:p>
@@ -9406,7 +9233,7 @@
           </a:p>
           <a:p>
             <a:r>
-              <a:rPr lang="en-US" dirty="0" smtClean="0"/>
+              <a:rPr lang="en-US" dirty="0"/>
               <a:t>Return best tour found at any time</a:t>
             </a:r>
           </a:p>
@@ -9414,7 +9241,7 @@
             <a:endParaRPr lang="en-US" dirty="0"/>
           </a:p>
           <a:p>
-            <a:endParaRPr lang="en-US" dirty="0" smtClean="0"/>
+            <a:endParaRPr lang="en-US" dirty="0"/>
           </a:p>
           <a:p>
             <a:endParaRPr lang="en-US" dirty="0"/>
@@ -9431,13 +9258,6 @@
   <p:clrMapOvr>
     <a:masterClrMapping/>
   </p:clrMapOvr>
-  <p:timing>
-    <p:tnLst>
-      <p:par>
-        <p:cTn id="1" dur="indefinite" restart="never" nodeType="tmRoot"/>
-      </p:par>
-    </p:tnLst>
-  </p:timing>
 </p:sld>
 </file>
 
@@ -9484,12 +9304,8 @@
               <a:buNone/>
             </a:pPr>
             <a:r>
-              <a:rPr lang="en-US" dirty="0" smtClean="0"/>
-              <a:t>From: http</a:t>
-            </a:r>
-            <a:r>
               <a:rPr lang="en-US" dirty="0"/>
-              <a:t>://toddwschneider.com/posts/traveling-salesman-with-simulated-annealing-r-and-shiny/</a:t>
+              <a:t>From: http://toddwschneider.com/posts/traveling-salesman-with-simulated-annealing-r-and-shiny/</a:t>
             </a:r>
           </a:p>
         </p:txBody>
@@ -9528,13 +9344,6 @@
   <p:clrMapOvr>
     <a:masterClrMapping/>
   </p:clrMapOvr>
-  <p:timing>
-    <p:tnLst>
-      <p:par>
-        <p:cTn id="1" dur="indefinite" restart="never" nodeType="tmRoot"/>
-      </p:par>
-    </p:tnLst>
-  </p:timing>
 </p:sld>
 </file>
 
@@ -9571,10 +9380,9 @@
           <a:lstStyle/>
           <a:p>
             <a:r>
-              <a:rPr lang="en-US" dirty="0" smtClean="0"/>
+              <a:rPr lang="en-US" dirty="0"/>
               <a:t>Genetic Algorithms</a:t>
             </a:r>
-            <a:endParaRPr lang="en-US" dirty="0"/>
           </a:p>
         </p:txBody>
       </p:sp>
@@ -9607,13 +9415,6 @@
   <p:clrMapOvr>
     <a:masterClrMapping/>
   </p:clrMapOvr>
-  <p:timing>
-    <p:tnLst>
-      <p:par>
-        <p:cTn id="1" dur="indefinite" restart="never" nodeType="tmRoot"/>
-      </p:par>
-    </p:tnLst>
-  </p:timing>
 </p:sld>
 </file>
 
@@ -9651,7 +9452,7 @@
           <a:p>
             <a:pPr eaLnBrk="1" hangingPunct="1"/>
             <a:r>
-              <a:rPr lang="en-GB" smtClean="0"/>
+              <a:rPr lang="en-GB"/>
               <a:t>General Scheme of GAs</a:t>
             </a:r>
           </a:p>
@@ -9699,13 +9500,6 @@
   <p:clrMapOvr>
     <a:masterClrMapping/>
   </p:clrMapOvr>
-  <p:timing>
-    <p:tnLst>
-      <p:par>
-        <p:cTn id="1" dur="indefinite" restart="never" nodeType="tmRoot"/>
-      </p:par>
-    </p:tnLst>
-  </p:timing>
 </p:sld>
 </file>
 
@@ -9743,7 +9537,7 @@
           <a:p>
             <a:pPr eaLnBrk="1" hangingPunct="1"/>
             <a:r>
-              <a:rPr lang="en-GB" smtClean="0"/>
+              <a:rPr lang="en-GB"/>
               <a:t>Pseudo-code for typical GA</a:t>
             </a:r>
           </a:p>
@@ -9791,13 +9585,6 @@
   <p:clrMapOvr>
     <a:masterClrMapping/>
   </p:clrMapOvr>
-  <p:timing>
-    <p:tnLst>
-      <p:par>
-        <p:cTn id="1" dur="indefinite" restart="never" nodeType="tmRoot"/>
-      </p:par>
-    </p:tnLst>
-  </p:timing>
 </p:sld>
 </file>
 
@@ -9834,10 +9621,9 @@
           <a:lstStyle/>
           <a:p>
             <a:r>
-              <a:rPr lang="en-US" dirty="0" smtClean="0"/>
+              <a:rPr lang="en-US" dirty="0"/>
               <a:t>Local Search: Characteristics/Advantages</a:t>
             </a:r>
-            <a:endParaRPr lang="en-US" dirty="0"/>
           </a:p>
         </p:txBody>
       </p:sp>
@@ -9862,7 +9648,7 @@
           <a:lstStyle/>
           <a:p>
             <a:r>
-              <a:rPr lang="en-US" dirty="0" smtClean="0"/>
+              <a:rPr lang="en-US" dirty="0"/>
               <a:t>Sometimes continuous search space (though not always)</a:t>
             </a:r>
           </a:p>
@@ -9871,7 +9657,7 @@
           </a:p>
           <a:p>
             <a:r>
-              <a:rPr lang="en-US" dirty="0" smtClean="0"/>
+              <a:rPr lang="en-US" dirty="0"/>
               <a:t>Concept of ‘neighboring’ solution states</a:t>
             </a:r>
           </a:p>
@@ -9880,14 +9666,14 @@
           </a:p>
           <a:p>
             <a:r>
-              <a:rPr lang="en-US" dirty="0" smtClean="0"/>
+              <a:rPr lang="en-US" dirty="0"/>
               <a:t>Very Little Memory</a:t>
             </a:r>
           </a:p>
           <a:p>
             <a:pPr lvl="1"/>
             <a:r>
-              <a:rPr lang="en-US" dirty="0" smtClean="0"/>
+              <a:rPr lang="en-US" dirty="0"/>
               <a:t>Usually Constant</a:t>
             </a:r>
           </a:p>
@@ -9897,10 +9683,9 @@
           </a:p>
           <a:p>
             <a:r>
-              <a:rPr lang="en-US" dirty="0" smtClean="0"/>
+              <a:rPr lang="en-US" dirty="0"/>
               <a:t>Can often find reasonable solutions in infinite (continuous) state spaces</a:t>
             </a:r>
-            <a:endParaRPr lang="en-US" dirty="0"/>
           </a:p>
         </p:txBody>
       </p:sp>
@@ -9938,13 +9723,6 @@
   <p:clrMapOvr>
     <a:masterClrMapping/>
   </p:clrMapOvr>
-  <p:timing>
-    <p:tnLst>
-      <p:par>
-        <p:cTn id="1" dur="indefinite" restart="never" nodeType="tmRoot"/>
-      </p:par>
-    </p:tnLst>
-  </p:timing>
 </p:sld>
 </file>
 
@@ -9982,7 +9760,7 @@
           <a:p>
             <a:pPr eaLnBrk="1" hangingPunct="1"/>
             <a:r>
-              <a:rPr lang="en-GB" smtClean="0"/>
+              <a:rPr lang="en-GB"/>
               <a:t>Representations</a:t>
             </a:r>
           </a:p>
@@ -10181,13 +9959,6 @@
   <p:clrMapOvr>
     <a:masterClrMapping/>
   </p:clrMapOvr>
-  <p:timing>
-    <p:tnLst>
-      <p:par>
-        <p:cTn id="1" dur="indefinite" restart="never" nodeType="tmRoot"/>
-      </p:par>
-    </p:tnLst>
-  </p:timing>
 </p:sld>
 </file>
 
@@ -10225,7 +9996,7 @@
           <a:p>
             <a:pPr eaLnBrk="1" hangingPunct="1"/>
             <a:r>
-              <a:rPr lang="en-GB" smtClean="0"/>
+              <a:rPr lang="en-GB"/>
               <a:t>Evaluation (Fitness) Function</a:t>
             </a:r>
           </a:p>
@@ -10292,7 +10063,7 @@
           <a:p>
             <a:pPr lvl="1" eaLnBrk="1" hangingPunct="1"/>
             <a:r>
-              <a:rPr lang="en-GB" dirty="0" smtClean="0"/>
+              <a:rPr lang="en-GB" dirty="0"/>
               <a:t>So the more discrimination (different values) the better</a:t>
             </a:r>
           </a:p>
@@ -10306,7 +10077,7 @@
           <a:p>
             <a:pPr lvl="1" eaLnBrk="1" hangingPunct="1"/>
             <a:r>
-              <a:rPr lang="en-GB" dirty="0" smtClean="0"/>
+              <a:rPr lang="en-GB" dirty="0"/>
               <a:t>Some problems may be best posed as minimisation problems, but conversion is trivial</a:t>
             </a:r>
           </a:p>
@@ -10315,7 +10086,7 @@
           </a:p>
           <a:p>
             <a:r>
-              <a:rPr lang="en-GB" b="1" dirty="0" smtClean="0"/>
+              <a:rPr lang="en-GB" b="1" dirty="0"/>
               <a:t>Short version: fitness function evaluates HOW GOOD a solution you’ve seen solves the given problem. Higher values mean the solution is closer to optimal.</a:t>
             </a:r>
           </a:p>
@@ -10331,13 +10102,6 @@
   <p:clrMapOvr>
     <a:masterClrMapping/>
   </p:clrMapOvr>
-  <p:timing>
-    <p:tnLst>
-      <p:par>
-        <p:cTn id="1" dur="indefinite" restart="never" nodeType="tmRoot"/>
-      </p:par>
-    </p:tnLst>
-  </p:timing>
 </p:sld>
 </file>
 
@@ -10375,7 +10139,7 @@
           <a:p>
             <a:pPr eaLnBrk="1" hangingPunct="1"/>
             <a:r>
-              <a:rPr lang="en-GB" smtClean="0"/>
+              <a:rPr lang="en-GB"/>
               <a:t>Population</a:t>
             </a:r>
           </a:p>
@@ -10409,17 +10173,13 @@
           </a:p>
           <a:p>
             <a:pPr eaLnBrk="1" hangingPunct="1"/>
-            <a:endParaRPr lang="en-GB" sz="2400" dirty="0" smtClean="0"/>
+            <a:endParaRPr lang="en-GB" sz="2400" dirty="0"/>
           </a:p>
           <a:p>
             <a:pPr eaLnBrk="1" hangingPunct="1"/>
             <a:r>
-              <a:rPr lang="en-GB" sz="2400" dirty="0" smtClean="0"/>
-              <a:t>Usually </a:t>
-            </a:r>
-            <a:r>
               <a:rPr lang="en-GB" sz="2400" dirty="0"/>
-              <a:t>has a fixed size and is a </a:t>
+              <a:t>Usually has a fixed size and is a </a:t>
             </a:r>
             <a:r>
               <a:rPr lang="en-GB" sz="2400" i="1" dirty="0"/>
@@ -10432,17 +10192,13 @@
           </a:p>
           <a:p>
             <a:pPr eaLnBrk="1" hangingPunct="1"/>
-            <a:endParaRPr lang="en-GB" sz="2400" dirty="0" smtClean="0"/>
+            <a:endParaRPr lang="en-GB" sz="2400" dirty="0"/>
           </a:p>
           <a:p>
             <a:pPr eaLnBrk="1" hangingPunct="1"/>
             <a:r>
-              <a:rPr lang="en-GB" sz="2400" dirty="0" smtClean="0"/>
-              <a:t>Selection </a:t>
-            </a:r>
-            <a:r>
               <a:rPr lang="en-GB" sz="2400" dirty="0"/>
-              <a:t>operators usually take whole population into account i.e.</a:t>
+              <a:t>Selection operators usually take whole population into account i.e.</a:t>
             </a:r>
             <a:r>
               <a:rPr lang="en-US" sz="2400" dirty="0"/>
@@ -10471,7 +10227,7 @@
           </a:p>
           <a:p>
             <a:pPr eaLnBrk="1" hangingPunct="1"/>
-            <a:endParaRPr lang="en-GB" sz="2400" dirty="0" smtClean="0">
+            <a:endParaRPr lang="en-GB" sz="2400" dirty="0">
               <a:solidFill>
                 <a:srgbClr val="FF0000"/>
               </a:solidFill>
@@ -10480,7 +10236,7 @@
           <a:p>
             <a:pPr eaLnBrk="1" hangingPunct="1"/>
             <a:r>
-              <a:rPr lang="en-GB" sz="2400" dirty="0" smtClean="0">
+              <a:rPr lang="en-GB" sz="2400" dirty="0">
                 <a:solidFill>
                   <a:srgbClr val="FF0000"/>
                 </a:solidFill>
@@ -10488,12 +10244,8 @@
               <a:t>Diversity</a:t>
             </a:r>
             <a:r>
-              <a:rPr lang="en-GB" sz="2400" dirty="0" smtClean="0"/>
-              <a:t>  </a:t>
-            </a:r>
-            <a:r>
               <a:rPr lang="en-GB" sz="2400" dirty="0"/>
-              <a:t>of a population refers to the number of different </a:t>
+              <a:t>  of a population refers to the number of different </a:t>
             </a:r>
             <a:r>
               <a:rPr lang="en-GB" sz="2400" dirty="0" err="1"/>
@@ -10516,13 +10268,6 @@
   <p:clrMapOvr>
     <a:masterClrMapping/>
   </p:clrMapOvr>
-  <p:timing>
-    <p:tnLst>
-      <p:par>
-        <p:cTn id="1" dur="indefinite" restart="never" nodeType="tmRoot"/>
-      </p:par>
-    </p:tnLst>
-  </p:timing>
 </p:sld>
 </file>
 
@@ -10560,7 +10305,7 @@
           <a:p>
             <a:pPr eaLnBrk="1" hangingPunct="1"/>
             <a:r>
-              <a:rPr lang="en-GB" smtClean="0"/>
+              <a:rPr lang="en-GB"/>
               <a:t>Parent Selection Mechanism</a:t>
             </a:r>
           </a:p>
@@ -10609,25 +10354,25 @@
           <a:p>
             <a:pPr lvl="1" eaLnBrk="1" hangingPunct="1"/>
             <a:r>
-              <a:rPr lang="en-GB" dirty="0" smtClean="0"/>
+              <a:rPr lang="en-GB" dirty="0"/>
               <a:t>high quality solutions more likely to become parents than low quality</a:t>
             </a:r>
           </a:p>
           <a:p>
             <a:pPr lvl="1" eaLnBrk="1" hangingPunct="1"/>
             <a:r>
-              <a:rPr lang="en-GB" dirty="0" smtClean="0"/>
+              <a:rPr lang="en-GB" dirty="0"/>
               <a:t>but not guaranteed</a:t>
             </a:r>
           </a:p>
           <a:p>
             <a:pPr lvl="1" eaLnBrk="1" hangingPunct="1"/>
             <a:r>
-              <a:rPr lang="en-US" dirty="0" smtClean="0"/>
+              <a:rPr lang="en-US" dirty="0"/>
               <a:t>even</a:t>
             </a:r>
             <a:r>
-              <a:rPr lang="en-GB" dirty="0" smtClean="0"/>
+              <a:rPr lang="en-GB" dirty="0"/>
               <a:t> worst in current population usually has non-zero probability of becoming a parent</a:t>
             </a:r>
           </a:p>
@@ -10665,13 +10410,6 @@
   <p:clrMapOvr>
     <a:masterClrMapping/>
   </p:clrMapOvr>
-  <p:timing>
-    <p:tnLst>
-      <p:par>
-        <p:cTn id="1" dur="indefinite" restart="never" nodeType="tmRoot"/>
-      </p:par>
-    </p:tnLst>
-  </p:timing>
 </p:sld>
 </file>
 
@@ -10709,7 +10447,7 @@
           <a:p>
             <a:pPr eaLnBrk="1" hangingPunct="1"/>
             <a:r>
-              <a:rPr lang="en-GB" smtClean="0"/>
+              <a:rPr lang="en-GB"/>
               <a:t>Parent Selection Mechanism</a:t>
             </a:r>
           </a:p>
@@ -10739,7 +10477,7 @@
           <a:p>
             <a:pPr eaLnBrk="1" hangingPunct="1"/>
             <a:r>
-              <a:rPr lang="en-US" sz="2400" dirty="0" smtClean="0"/>
+              <a:rPr lang="en-US" sz="2400" dirty="0"/>
               <a:t>Use our friend, the sigmoid function.</a:t>
             </a:r>
           </a:p>
@@ -10750,14 +10488,14 @@
           <a:p>
             <a:pPr eaLnBrk="1" hangingPunct="1"/>
             <a:r>
-              <a:rPr lang="en-US" sz="2400" dirty="0" smtClean="0"/>
+              <a:rPr lang="en-US" sz="2400" dirty="0"/>
               <a:t>How would this work?</a:t>
             </a:r>
           </a:p>
           <a:p>
             <a:pPr lvl="1"/>
             <a:r>
-              <a:rPr lang="en-GB" sz="1900" dirty="0" smtClean="0"/>
+              <a:rPr lang="en-GB" sz="1900" dirty="0"/>
               <a:t>Need to map fitness quality onto the x-axis so that good solutions have high probabilities of being chosen as parents.</a:t>
             </a:r>
           </a:p>
@@ -10768,10 +10506,9 @@
           <a:p>
             <a:pPr lvl="1"/>
             <a:r>
-              <a:rPr lang="en-GB" sz="1900" dirty="0" smtClean="0"/>
+              <a:rPr lang="en-GB" sz="1900" dirty="0"/>
               <a:t>Then, flip some coins to see which parents get selected.</a:t>
             </a:r>
-            <a:endParaRPr lang="en-GB" sz="1900" dirty="0"/>
           </a:p>
         </p:txBody>
       </p:sp>
@@ -10826,13 +10563,6 @@
   <p:clrMapOvr>
     <a:masterClrMapping/>
   </p:clrMapOvr>
-  <p:timing>
-    <p:tnLst>
-      <p:par>
-        <p:cTn id="1" dur="indefinite" restart="never" nodeType="tmRoot"/>
-      </p:par>
-    </p:tnLst>
-  </p:timing>
 </p:sld>
 </file>
 
@@ -10870,7 +10600,7 @@
           <a:p>
             <a:pPr eaLnBrk="1" hangingPunct="1"/>
             <a:r>
-              <a:rPr lang="en-GB" smtClean="0"/>
+              <a:rPr lang="en-GB"/>
               <a:t>Variation Operators</a:t>
             </a:r>
           </a:p>
@@ -10899,17 +10629,13 @@
           </a:p>
           <a:p>
             <a:pPr eaLnBrk="1" hangingPunct="1"/>
-            <a:endParaRPr lang="en-GB" sz="2400" dirty="0" smtClean="0"/>
+            <a:endParaRPr lang="en-GB" sz="2400" dirty="0"/>
           </a:p>
           <a:p>
             <a:pPr eaLnBrk="1" hangingPunct="1"/>
             <a:r>
-              <a:rPr lang="en-GB" sz="2400" dirty="0" smtClean="0"/>
-              <a:t>Usually </a:t>
-            </a:r>
-            <a:r>
               <a:rPr lang="en-GB" sz="2400" dirty="0"/>
-              <a:t>divided into two types according to their </a:t>
+              <a:t>Usually divided into two types according to their </a:t>
             </a:r>
             <a:r>
               <a:rPr lang="en-GB" sz="2400" dirty="0" err="1">
@@ -10985,13 +10711,6 @@
   <p:clrMapOvr>
     <a:masterClrMapping/>
   </p:clrMapOvr>
-  <p:timing>
-    <p:tnLst>
-      <p:par>
-        <p:cTn id="1" dur="indefinite" restart="never" nodeType="tmRoot"/>
-      </p:par>
-    </p:tnLst>
-  </p:timing>
 </p:sld>
 </file>
 
@@ -11029,7 +10748,7 @@
           <a:p>
             <a:pPr eaLnBrk="1" hangingPunct="1"/>
             <a:r>
-              <a:rPr lang="en-GB" smtClean="0"/>
+              <a:rPr lang="en-GB"/>
               <a:t>Mutation</a:t>
             </a:r>
           </a:p>
@@ -11127,13 +10846,6 @@
   <p:clrMapOvr>
     <a:masterClrMapping/>
   </p:clrMapOvr>
-  <p:timing>
-    <p:tnLst>
-      <p:par>
-        <p:cTn id="1" dur="indefinite" restart="never" nodeType="tmRoot"/>
-      </p:par>
-    </p:tnLst>
-  </p:timing>
 </p:sld>
 </file>
 
@@ -11171,7 +10883,7 @@
           <a:p>
             <a:pPr eaLnBrk="1" hangingPunct="1"/>
             <a:r>
-              <a:rPr lang="en-GB" smtClean="0"/>
+              <a:rPr lang="en-GB"/>
               <a:t>Recombination</a:t>
             </a:r>
           </a:p>
@@ -11207,62 +10919,46 @@
           </a:p>
           <a:p>
             <a:pPr eaLnBrk="1" hangingPunct="1"/>
-            <a:endParaRPr lang="en-GB" sz="2400" dirty="0" smtClean="0"/>
+            <a:endParaRPr lang="en-GB" sz="2400" dirty="0"/>
           </a:p>
           <a:p>
             <a:pPr eaLnBrk="1" hangingPunct="1"/>
             <a:r>
-              <a:rPr lang="en-GB" sz="2400" dirty="0" smtClean="0"/>
-              <a:t>Choice </a:t>
-            </a:r>
-            <a:r>
               <a:rPr lang="en-GB" sz="2400" dirty="0"/>
-              <a:t>of what information to merge is stochastic</a:t>
+              <a:t>Choice of what information to merge is stochastic</a:t>
             </a:r>
           </a:p>
           <a:p>
             <a:pPr eaLnBrk="1" hangingPunct="1"/>
-            <a:endParaRPr lang="en-GB" sz="2400" dirty="0" smtClean="0"/>
+            <a:endParaRPr lang="en-GB" sz="2400" dirty="0"/>
           </a:p>
           <a:p>
             <a:pPr eaLnBrk="1" hangingPunct="1"/>
             <a:r>
-              <a:rPr lang="en-GB" sz="2400" dirty="0" smtClean="0"/>
-              <a:t>Most </a:t>
-            </a:r>
-            <a:r>
               <a:rPr lang="en-GB" sz="2400" dirty="0"/>
-              <a:t>offspring may be worse, or the same as the parents</a:t>
+              <a:t>Most offspring may be worse, or the same as the parents</a:t>
             </a:r>
           </a:p>
           <a:p>
             <a:pPr eaLnBrk="1" hangingPunct="1"/>
-            <a:endParaRPr lang="en-GB" sz="2400" dirty="0" smtClean="0"/>
+            <a:endParaRPr lang="en-GB" sz="2400" dirty="0"/>
           </a:p>
           <a:p>
             <a:pPr eaLnBrk="1" hangingPunct="1"/>
             <a:r>
-              <a:rPr lang="en-GB" sz="2400" dirty="0" smtClean="0"/>
-              <a:t>Hope </a:t>
-            </a:r>
-            <a:r>
               <a:rPr lang="en-GB" sz="2400" dirty="0"/>
-              <a:t>is that some are better by combining elements of genotypes that lead to good traits</a:t>
+              <a:t>Hope is that some are better by combining elements of genotypes that lead to good traits</a:t>
             </a:r>
           </a:p>
           <a:p>
             <a:pPr eaLnBrk="1" hangingPunct="1"/>
-            <a:endParaRPr lang="en-GB" sz="2400" dirty="0" smtClean="0"/>
+            <a:endParaRPr lang="en-GB" sz="2400" dirty="0"/>
           </a:p>
           <a:p>
             <a:pPr eaLnBrk="1" hangingPunct="1"/>
             <a:r>
-              <a:rPr lang="en-GB" sz="2400" dirty="0" smtClean="0"/>
-              <a:t>Principle </a:t>
-            </a:r>
-            <a:r>
               <a:rPr lang="en-GB" sz="2400" dirty="0"/>
-              <a:t>has been used for millennia by breeders of plants and livestock</a:t>
+              <a:t>Principle has been used for millennia by breeders of plants and livestock</a:t>
             </a:r>
           </a:p>
         </p:txBody>
@@ -11277,13 +10973,6 @@
   <p:clrMapOvr>
     <a:masterClrMapping/>
   </p:clrMapOvr>
-  <p:timing>
-    <p:tnLst>
-      <p:par>
-        <p:cTn id="1" dur="indefinite" restart="never" nodeType="tmRoot"/>
-      </p:par>
-    </p:tnLst>
-  </p:timing>
 </p:sld>
 </file>
 
@@ -11321,7 +11010,7 @@
           <a:p>
             <a:pPr eaLnBrk="1" hangingPunct="1"/>
             <a:r>
-              <a:rPr lang="en-GB" smtClean="0"/>
+              <a:rPr lang="en-GB"/>
               <a:t>Survivor Selection</a:t>
             </a:r>
           </a:p>
@@ -11360,85 +11049,73 @@
           </a:p>
           <a:p>
             <a:pPr eaLnBrk="1" hangingPunct="1"/>
-            <a:endParaRPr lang="en-GB" sz="2400" dirty="0" smtClean="0"/>
+            <a:endParaRPr lang="en-GB" sz="2400" dirty="0"/>
           </a:p>
           <a:p>
             <a:pPr eaLnBrk="1" hangingPunct="1"/>
             <a:r>
-              <a:rPr lang="en-GB" sz="2400" dirty="0" smtClean="0"/>
-              <a:t>Most </a:t>
-            </a:r>
-            <a:r>
               <a:rPr lang="en-GB" sz="2400" dirty="0"/>
-              <a:t>EAs use fixed population size so need a way of going from (parents + offspring) to next generation</a:t>
+              <a:t>Most EAs use fixed population size so need a way of going from (parents + offspring) to next generation</a:t>
             </a:r>
           </a:p>
           <a:p>
             <a:pPr eaLnBrk="1" hangingPunct="1"/>
-            <a:endParaRPr lang="en-GB" sz="2400" dirty="0" smtClean="0"/>
+            <a:endParaRPr lang="en-GB" sz="2400" dirty="0"/>
           </a:p>
           <a:p>
             <a:pPr eaLnBrk="1" hangingPunct="1"/>
             <a:r>
-              <a:rPr lang="en-GB" sz="2400" dirty="0" smtClean="0"/>
-              <a:t>Often </a:t>
-            </a:r>
-            <a:r>
               <a:rPr lang="en-GB" sz="2400" dirty="0"/>
-              <a:t>deterministic</a:t>
+              <a:t>Often deterministic</a:t>
             </a:r>
           </a:p>
           <a:p>
             <a:pPr lvl="1" eaLnBrk="1" hangingPunct="1"/>
             <a:r>
-              <a:rPr lang="en-GB" dirty="0" smtClean="0"/>
+              <a:rPr lang="en-GB" dirty="0"/>
               <a:t>Fitness based : e.g.</a:t>
             </a:r>
             <a:r>
-              <a:rPr lang="en-US" dirty="0" smtClean="0"/>
+              <a:rPr lang="en-US" dirty="0"/>
               <a:t>,</a:t>
             </a:r>
             <a:r>
-              <a:rPr lang="en-GB" dirty="0" smtClean="0"/>
+              <a:rPr lang="en-GB" dirty="0"/>
               <a:t> rank </a:t>
             </a:r>
             <a:r>
-              <a:rPr lang="en-GB" dirty="0" err="1" smtClean="0"/>
+              <a:rPr lang="en-GB" dirty="0" err="1"/>
               <a:t>parents+offspring</a:t>
             </a:r>
             <a:r>
-              <a:rPr lang="en-GB" dirty="0" smtClean="0"/>
+              <a:rPr lang="en-GB" dirty="0"/>
               <a:t> and take best </a:t>
             </a:r>
           </a:p>
           <a:p>
             <a:pPr lvl="1" eaLnBrk="1" hangingPunct="1"/>
             <a:r>
-              <a:rPr lang="en-GB" dirty="0" smtClean="0"/>
+              <a:rPr lang="en-GB" dirty="0"/>
               <a:t>Age based</a:t>
             </a:r>
             <a:r>
-              <a:rPr lang="en-US" dirty="0" smtClean="0"/>
+              <a:rPr lang="en-US" dirty="0"/>
               <a:t>:</a:t>
             </a:r>
             <a:r>
-              <a:rPr lang="en-GB" dirty="0" smtClean="0"/>
+              <a:rPr lang="en-GB" dirty="0"/>
               <a:t> make as many offspring as parents and delete all parents </a:t>
             </a:r>
           </a:p>
           <a:p>
             <a:pPr eaLnBrk="1" hangingPunct="1"/>
-            <a:endParaRPr lang="en-GB" sz="2400" dirty="0" smtClean="0"/>
+            <a:endParaRPr lang="en-GB" sz="2400" dirty="0"/>
           </a:p>
           <a:p>
             <a:pPr eaLnBrk="1" hangingPunct="1"/>
             <a:r>
-              <a:rPr lang="en-GB" sz="2400" dirty="0" smtClean="0"/>
-              <a:t>Sometimes </a:t>
-            </a:r>
-            <a:r>
               <a:rPr lang="en-GB" sz="2400" dirty="0"/>
-              <a:t>do combination (elitism)</a:t>
+              <a:t>Sometimes do combination (elitism)</a:t>
             </a:r>
           </a:p>
         </p:txBody>
@@ -11453,13 +11130,6 @@
   <p:clrMapOvr>
     <a:masterClrMapping/>
   </p:clrMapOvr>
-  <p:timing>
-    <p:tnLst>
-      <p:par>
-        <p:cTn id="1" dur="indefinite" restart="never" nodeType="tmRoot"/>
-      </p:par>
-    </p:tnLst>
-  </p:timing>
 </p:sld>
 </file>
 
@@ -11497,11 +11167,11 @@
           <a:p>
             <a:pPr eaLnBrk="1" hangingPunct="1"/>
             <a:r>
-              <a:rPr lang="en-US" smtClean="0"/>
+              <a:rPr lang="en-US"/>
               <a:t>Initialization</a:t>
             </a:r>
             <a:r>
-              <a:rPr lang="en-GB" smtClean="0"/>
+              <a:rPr lang="en-GB"/>
               <a:t> / Termination</a:t>
             </a:r>
           </a:p>
@@ -11604,13 +11274,6 @@
   <p:clrMapOvr>
     <a:masterClrMapping/>
   </p:clrMapOvr>
-  <p:timing>
-    <p:tnLst>
-      <p:par>
-        <p:cTn id="1" dur="indefinite" restart="never" nodeType="tmRoot"/>
-      </p:par>
-    </p:tnLst>
-  </p:timing>
 </p:sld>
 </file>
 
@@ -11647,10 +11310,9 @@
           <a:lstStyle/>
           <a:p>
             <a:r>
-              <a:rPr lang="en-US" dirty="0" smtClean="0"/>
+              <a:rPr lang="en-US" dirty="0"/>
               <a:t>Local Search: Characteristics/Advantages</a:t>
             </a:r>
-            <a:endParaRPr lang="en-US" dirty="0"/>
           </a:p>
         </p:txBody>
       </p:sp>
@@ -11675,7 +11337,7 @@
           <a:lstStyle/>
           <a:p>
             <a:r>
-              <a:rPr lang="en-US" dirty="0" smtClean="0"/>
+              <a:rPr lang="en-US" dirty="0"/>
               <a:t>Usually no ‘start state’. We just generate one however we want.</a:t>
             </a:r>
           </a:p>
@@ -11684,10 +11346,9 @@
           </a:p>
           <a:p>
             <a:r>
-              <a:rPr lang="en-US" dirty="0" smtClean="0"/>
+              <a:rPr lang="en-US" dirty="0"/>
               <a:t>Search space is usually VERY large, so not possible to search everything.</a:t>
             </a:r>
-            <a:endParaRPr lang="en-US" dirty="0"/>
           </a:p>
         </p:txBody>
       </p:sp>
@@ -11725,13 +11386,6 @@
   <p:clrMapOvr>
     <a:masterClrMapping/>
   </p:clrMapOvr>
-  <p:timing>
-    <p:tnLst>
-      <p:par>
-        <p:cTn id="1" dur="indefinite" restart="never" nodeType="tmRoot"/>
-      </p:par>
-    </p:tnLst>
-  </p:timing>
 </p:sld>
 </file>
 
@@ -11769,10 +11423,10 @@
           <a:p>
             <a:pPr eaLnBrk="1" hangingPunct="1"/>
             <a:r>
-              <a:rPr lang="en-US" dirty="0" smtClean="0"/>
+              <a:rPr lang="en-US" dirty="0"/>
               <a:t>Fun Example</a:t>
             </a:r>
-            <a:endParaRPr lang="en-GB" dirty="0" smtClean="0"/>
+            <a:endParaRPr lang="en-GB" dirty="0"/>
           </a:p>
         </p:txBody>
       </p:sp>
@@ -11806,7 +11460,7 @@
               <a:buNone/>
             </a:pPr>
             <a:r>
-              <a:rPr lang="en-US" sz="2400" dirty="0" smtClean="0"/>
+              <a:rPr lang="en-US" sz="2400" dirty="0"/>
               <a:t>Smart Rockets:</a:t>
             </a:r>
           </a:p>
@@ -11831,13 +11485,6 @@
   <p:clrMapOvr>
     <a:masterClrMapping/>
   </p:clrMapOvr>
-  <p:timing>
-    <p:tnLst>
-      <p:par>
-        <p:cTn id="1" dur="indefinite" restart="never" nodeType="tmRoot"/>
-      </p:par>
-    </p:tnLst>
-  </p:timing>
 </p:sld>
 </file>
 
@@ -14257,13 +13904,7 @@
               <a:rPr lang="en-US" dirty="0">
                 <a:latin typeface="Arial" charset="0"/>
               </a:rPr>
-              <a:t>such a way that they cannot check each </a:t>
-            </a:r>
-            <a:r>
-              <a:rPr lang="en-US" dirty="0" smtClean="0">
-                <a:latin typeface="Arial" charset="0"/>
-              </a:rPr>
-              <a:t>other</a:t>
+              <a:t>such a way that they cannot check each other</a:t>
             </a:r>
           </a:p>
           <a:p>
@@ -14273,26 +13914,23 @@
           </a:p>
           <a:p>
             <a:r>
-              <a:rPr lang="en-US" dirty="0" smtClean="0">
+              <a:rPr lang="en-US" dirty="0">
                 <a:latin typeface="Arial" charset="0"/>
               </a:rPr>
               <a:t>Harder when </a:t>
             </a:r>
             <a:r>
-              <a:rPr lang="en-US" dirty="0" err="1" smtClean="0">
+              <a:rPr lang="en-US" dirty="0" err="1">
                 <a:latin typeface="Arial" charset="0"/>
               </a:rPr>
               <a:t>NxN</a:t>
             </a:r>
             <a:r>
-              <a:rPr lang="en-US" dirty="0" smtClean="0">
+              <a:rPr lang="en-US" dirty="0">
                 <a:latin typeface="Arial" charset="0"/>
               </a:rPr>
               <a:t> board and need to place N queens</a:t>
             </a:r>
-            <a:endParaRPr lang="en-US" dirty="0">
-              <a:latin typeface="Arial" charset="0"/>
-            </a:endParaRPr>
           </a:p>
         </p:txBody>
       </p:sp>
@@ -14358,13 +13996,6 @@
     <a:masterClrMapping/>
   </p:clrMapOvr>
   <p:transition/>
-  <p:timing>
-    <p:tnLst>
-      <p:par>
-        <p:cTn id="1" dur="indefinite" restart="never" nodeType="tmRoot"/>
-      </p:par>
-    </p:tnLst>
-  </p:timing>
 </p:sld>
 </file>
 
@@ -14420,7 +14051,7 @@
               </a:spcAft>
             </a:pPr>
             <a:r>
-              <a:rPr lang="en-US" smtClean="0"/>
+              <a:rPr lang="en-US"/>
               <a:t>The 8 queens problem: r</a:t>
             </a:r>
             <a:r>
@@ -17962,13 +17593,6 @@
     <a:masterClrMapping/>
   </p:clrMapOvr>
   <p:transition/>
-  <p:timing>
-    <p:tnLst>
-      <p:par>
-        <p:cTn id="1" dur="indefinite" restart="never" nodeType="tmRoot"/>
-      </p:par>
-    </p:tnLst>
-  </p:timing>
 </p:sld>
 </file>
 
@@ -18168,13 +17792,6 @@
     <a:masterClrMapping/>
   </p:clrMapOvr>
   <p:transition/>
-  <p:timing>
-    <p:tnLst>
-      <p:par>
-        <p:cTn id="1" dur="indefinite" restart="never" nodeType="tmRoot"/>
-      </p:par>
-    </p:tnLst>
-  </p:timing>
 </p:sld>
 </file>
 
@@ -19577,13 +19194,6 @@
     <a:masterClrMapping/>
   </p:clrMapOvr>
   <p:transition/>
-  <p:timing>
-    <p:tnLst>
-      <p:par>
-        <p:cTn id="1" dur="indefinite" restart="never" nodeType="tmRoot"/>
-      </p:par>
-    </p:tnLst>
-  </p:timing>
 </p:sld>
 </file>
 
@@ -21409,13 +21019,6 @@
     <a:masterClrMapping/>
   </p:clrMapOvr>
   <p:transition/>
-  <p:timing>
-    <p:tnLst>
-      <p:par>
-        <p:cTn id="1" dur="indefinite" restart="never" nodeType="tmRoot"/>
-      </p:par>
-    </p:tnLst>
-  </p:timing>
 </p:sld>
 </file>
 
@@ -21458,46 +21061,46 @@
           <a:p>
             <a:pPr eaLnBrk="1" hangingPunct="1"/>
             <a:r>
-              <a:rPr lang="en-US" dirty="0" smtClean="0"/>
+              <a:rPr lang="en-US" dirty="0"/>
               <a:t>Parent selection:</a:t>
             </a:r>
           </a:p>
           <a:p>
             <a:pPr lvl="1" eaLnBrk="1" hangingPunct="1"/>
             <a:r>
-              <a:rPr lang="en-US" dirty="0" smtClean="0"/>
+              <a:rPr lang="en-US" dirty="0"/>
               <a:t>Pick 5 parents and take best two to undergo crossover</a:t>
             </a:r>
           </a:p>
           <a:p>
             <a:pPr eaLnBrk="1" hangingPunct="1"/>
-            <a:endParaRPr lang="en-US" dirty="0" smtClean="0"/>
+            <a:endParaRPr lang="en-US" dirty="0"/>
           </a:p>
           <a:p>
             <a:pPr eaLnBrk="1" hangingPunct="1"/>
             <a:r>
-              <a:rPr lang="en-US" dirty="0" smtClean="0"/>
+              <a:rPr lang="en-US" dirty="0"/>
               <a:t>Survivor selection (replacement)</a:t>
             </a:r>
           </a:p>
           <a:p>
             <a:pPr lvl="1" eaLnBrk="1" hangingPunct="1"/>
             <a:r>
-              <a:rPr lang="en-GB" dirty="0" smtClean="0"/>
+              <a:rPr lang="en-GB" dirty="0"/>
               <a:t>insert the two new children into the population</a:t>
             </a:r>
           </a:p>
           <a:p>
             <a:pPr lvl="1" eaLnBrk="1" hangingPunct="1"/>
             <a:r>
-              <a:rPr lang="en-GB" dirty="0" smtClean="0"/>
+              <a:rPr lang="en-GB" dirty="0"/>
               <a:t>sort the whole population by decreasing fitness</a:t>
             </a:r>
           </a:p>
           <a:p>
             <a:pPr lvl="1" eaLnBrk="1" hangingPunct="1"/>
             <a:r>
-              <a:rPr lang="en-GB" dirty="0" smtClean="0"/>
+              <a:rPr lang="en-GB" dirty="0"/>
               <a:t>delete the worst two</a:t>
             </a:r>
           </a:p>
@@ -21564,13 +21167,6 @@
     <a:masterClrMapping/>
   </p:clrMapOvr>
   <p:transition/>
-  <p:timing>
-    <p:tnLst>
-      <p:par>
-        <p:cTn id="1" dur="indefinite" restart="never" nodeType="tmRoot"/>
-      </p:par>
-    </p:tnLst>
-  </p:timing>
 </p:sld>
 </file>
 
@@ -21608,7 +21204,7 @@
           <a:p>
             <a:pPr eaLnBrk="1" hangingPunct="1"/>
             <a:r>
-              <a:rPr lang="en-GB" smtClean="0"/>
+              <a:rPr lang="en-GB"/>
               <a:t>8 Queens Problem: summary</a:t>
             </a:r>
           </a:p>
@@ -21717,13 +21313,6 @@
   <p:clrMapOvr>
     <a:masterClrMapping/>
   </p:clrMapOvr>
-  <p:timing>
-    <p:tnLst>
-      <p:par>
-        <p:cTn id="1" dur="indefinite" restart="never" nodeType="tmRoot"/>
-      </p:par>
-    </p:tnLst>
-  </p:timing>
 </p:sld>
 </file>
 
@@ -21766,7 +21355,7 @@
           <a:p>
             <a:pPr eaLnBrk="1" hangingPunct="1"/>
             <a:r>
-              <a:rPr lang="en-US" dirty="0" smtClean="0"/>
+              <a:rPr lang="en-US" dirty="0"/>
               <a:t>Do on your own:</a:t>
             </a:r>
           </a:p>
@@ -21777,14 +21366,10 @@
           <a:p>
             <a:pPr eaLnBrk="1" hangingPunct="1"/>
             <a:r>
-              <a:rPr lang="en-US" i="1" dirty="0" smtClean="0"/>
-              <a:t>Design a </a:t>
-            </a:r>
-            <a:r>
-              <a:rPr lang="en-US" i="1" dirty="0" smtClean="0"/>
-              <a:t>GA that attempts to 3-color a graph</a:t>
-            </a:r>
-            <a:endParaRPr lang="en-GB" i="1" dirty="0" smtClean="0"/>
+              <a:rPr lang="en-US" i="1" dirty="0"/>
+              <a:t>Design a GA that attempts to 3-color a graph</a:t>
+            </a:r>
+            <a:endParaRPr lang="en-GB" i="1" dirty="0"/>
           </a:p>
         </p:txBody>
       </p:sp>
@@ -21830,14 +21415,11 @@
               </a:spcAft>
             </a:pPr>
             <a:r>
-              <a:rPr lang="en-US" sz="3600" dirty="0" smtClean="0">
+              <a:rPr lang="en-US" sz="3600" dirty="0">
                 <a:latin typeface="Arial" charset="0"/>
               </a:rPr>
               <a:t>Practice: 3-Coloring</a:t>
             </a:r>
-            <a:endParaRPr lang="en-US" sz="3600" dirty="0">
-              <a:latin typeface="Arial" charset="0"/>
-            </a:endParaRPr>
           </a:p>
         </p:txBody>
       </p:sp>
@@ -21852,13 +21434,6 @@
     <a:masterClrMapping/>
   </p:clrMapOvr>
   <p:transition/>
-  <p:timing>
-    <p:tnLst>
-      <p:par>
-        <p:cTn id="1" dur="indefinite" restart="never" nodeType="tmRoot"/>
-      </p:par>
-    </p:tnLst>
-  </p:timing>
 </p:sld>
 </file>
 
@@ -21895,10 +21470,9 @@
           <a:lstStyle/>
           <a:p>
             <a:r>
-              <a:rPr lang="en-US" dirty="0" smtClean="0"/>
+              <a:rPr lang="en-US" dirty="0"/>
               <a:t>Local Search: Random Walk</a:t>
             </a:r>
-            <a:endParaRPr lang="en-US" dirty="0"/>
           </a:p>
         </p:txBody>
       </p:sp>
@@ -21918,7 +21492,7 @@
           <a:lstStyle/>
           <a:p>
             <a:r>
-              <a:rPr lang="en-US" dirty="0" smtClean="0"/>
+              <a:rPr lang="en-US" dirty="0"/>
               <a:t>1. Pick a random point</a:t>
             </a:r>
           </a:p>
@@ -21927,8 +21501,8 @@
           </a:p>
           <a:p>
             <a:r>
-              <a:rPr lang="en-US" dirty="0" smtClean="0"/>
-              <a:t>2. Look at your neighbors</a:t>
+              <a:rPr lang="en-US" dirty="0"/>
+              <a:t>2. Pick random neighbor</a:t>
             </a:r>
           </a:p>
           <a:p>
@@ -21936,8 +21510,8 @@
           </a:p>
           <a:p>
             <a:r>
-              <a:rPr lang="en-US" dirty="0" smtClean="0"/>
-              <a:t>3. Move in a random direction</a:t>
+              <a:rPr lang="en-US" dirty="0"/>
+              <a:t>3. Move to neighbor (no matter what)</a:t>
             </a:r>
           </a:p>
           <a:p>
@@ -21945,10 +21519,9 @@
           </a:p>
           <a:p>
             <a:r>
-              <a:rPr lang="en-US" dirty="0" smtClean="0"/>
+              <a:rPr lang="en-US" dirty="0"/>
               <a:t>Issues?</a:t>
             </a:r>
-            <a:endParaRPr lang="en-US" dirty="0"/>
           </a:p>
         </p:txBody>
       </p:sp>
@@ -21986,13 +21559,6 @@
   <p:clrMapOvr>
     <a:masterClrMapping/>
   </p:clrMapOvr>
-  <p:timing>
-    <p:tnLst>
-      <p:par>
-        <p:cTn id="1" dur="indefinite" restart="never" nodeType="tmRoot"/>
-      </p:par>
-    </p:tnLst>
-  </p:timing>
 </p:sld>
 </file>
 
@@ -22029,10 +21595,9 @@
           <a:lstStyle/>
           <a:p>
             <a:r>
-              <a:rPr lang="en-US" dirty="0" smtClean="0"/>
+              <a:rPr lang="en-US" dirty="0"/>
               <a:t>Local Search: Random Walk Improvement</a:t>
             </a:r>
-            <a:endParaRPr lang="en-US" dirty="0"/>
           </a:p>
         </p:txBody>
       </p:sp>
@@ -22052,14 +21617,14 @@
           <a:lstStyle/>
           <a:p>
             <a:r>
-              <a:rPr lang="en-US" dirty="0" smtClean="0"/>
+              <a:rPr lang="en-US" dirty="0"/>
               <a:t>1. Pick ‘x’ random points</a:t>
             </a:r>
           </a:p>
           <a:p>
             <a:pPr lvl="1"/>
             <a:r>
-              <a:rPr lang="en-US" dirty="0" smtClean="0"/>
+              <a:rPr lang="en-US" dirty="0"/>
               <a:t>Maybe 1000 or more?</a:t>
             </a:r>
           </a:p>
@@ -22068,7 +21633,7 @@
           </a:p>
           <a:p>
             <a:r>
-              <a:rPr lang="en-US" dirty="0" smtClean="0"/>
+              <a:rPr lang="en-US" dirty="0"/>
               <a:t>2. Look at your neighbors of each</a:t>
             </a:r>
           </a:p>
@@ -22077,7 +21642,7 @@
           </a:p>
           <a:p>
             <a:r>
-              <a:rPr lang="en-US" dirty="0" smtClean="0"/>
+              <a:rPr lang="en-US" dirty="0"/>
               <a:t>3. Each moves in a random direction</a:t>
             </a:r>
           </a:p>
@@ -22086,10 +21651,9 @@
           </a:p>
           <a:p>
             <a:r>
-              <a:rPr lang="en-US" dirty="0" smtClean="0"/>
+              <a:rPr lang="en-US" dirty="0"/>
               <a:t>Issues?</a:t>
             </a:r>
-            <a:endParaRPr lang="en-US" dirty="0"/>
           </a:p>
         </p:txBody>
       </p:sp>
@@ -22127,13 +21691,6 @@
   <p:clrMapOvr>
     <a:masterClrMapping/>
   </p:clrMapOvr>
-  <p:timing>
-    <p:tnLst>
-      <p:par>
-        <p:cTn id="1" dur="indefinite" restart="never" nodeType="tmRoot"/>
-      </p:par>
-    </p:tnLst>
-  </p:timing>
 </p:sld>
 </file>
 
@@ -22170,10 +21727,9 @@
           <a:lstStyle/>
           <a:p>
             <a:r>
-              <a:rPr lang="en-US" dirty="0" smtClean="0"/>
+              <a:rPr lang="en-US" dirty="0"/>
               <a:t>Local Search: Greedy Algorithm</a:t>
             </a:r>
-            <a:endParaRPr lang="en-US" dirty="0"/>
           </a:p>
         </p:txBody>
       </p:sp>
@@ -22189,11 +21745,13 @@
         </p:nvSpPr>
         <p:spPr/>
         <p:txBody>
-          <a:bodyPr/>
+          <a:bodyPr>
+            <a:normAutofit lnSpcReduction="10000"/>
+          </a:bodyPr>
           <a:lstStyle/>
           <a:p>
             <a:r>
-              <a:rPr lang="en-US" dirty="0" smtClean="0"/>
+              <a:rPr lang="en-US" dirty="0"/>
               <a:t>1. Pick a random point</a:t>
             </a:r>
           </a:p>
@@ -22202,8 +21760,8 @@
           </a:p>
           <a:p>
             <a:r>
-              <a:rPr lang="en-US" dirty="0" smtClean="0"/>
-              <a:t>2. Look at your neighbors</a:t>
+              <a:rPr lang="en-US" dirty="0"/>
+              <a:t>2. Pick random neighbor</a:t>
             </a:r>
           </a:p>
           <a:p>
@@ -22211,8 +21769,8 @@
           </a:p>
           <a:p>
             <a:r>
-              <a:rPr lang="en-US" dirty="0" smtClean="0"/>
-              <a:t>3. Keep going up until you find the maximum</a:t>
+              <a:rPr lang="en-US" dirty="0"/>
+              <a:t>3. Move only if neighbor is better </a:t>
             </a:r>
           </a:p>
           <a:p>
@@ -22220,10 +21778,18 @@
           </a:p>
           <a:p>
             <a:r>
-              <a:rPr lang="en-US" dirty="0" smtClean="0"/>
+              <a:rPr lang="en-US" dirty="0"/>
+              <a:t>4. Keep going up until you find the maximum</a:t>
+            </a:r>
+          </a:p>
+          <a:p>
+            <a:endParaRPr lang="en-US" dirty="0"/>
+          </a:p>
+          <a:p>
+            <a:r>
+              <a:rPr lang="en-US" dirty="0"/>
               <a:t>Issues?</a:t>
             </a:r>
-            <a:endParaRPr lang="en-US" dirty="0"/>
           </a:p>
         </p:txBody>
       </p:sp>
@@ -22261,13 +21827,6 @@
   <p:clrMapOvr>
     <a:masterClrMapping/>
   </p:clrMapOvr>
-  <p:timing>
-    <p:tnLst>
-      <p:par>
-        <p:cTn id="1" dur="indefinite" restart="never" nodeType="tmRoot"/>
-      </p:par>
-    </p:tnLst>
-  </p:timing>
 </p:sld>
 </file>
 
@@ -22305,7 +21864,7 @@
           <a:p>
             <a:pPr eaLnBrk="1" hangingPunct="1"/>
             <a:r>
-              <a:rPr lang="en-US" dirty="0" smtClean="0"/>
+              <a:rPr lang="en-US" dirty="0"/>
               <a:t>Random Walk vs. Hill Climbing</a:t>
             </a:r>
           </a:p>
@@ -22337,7 +21896,7 @@
               <a:buNone/>
             </a:pPr>
             <a:r>
-              <a:rPr lang="en-US" dirty="0" smtClean="0"/>
+              <a:rPr lang="en-US" dirty="0"/>
               <a:t>Random Walk</a:t>
             </a:r>
           </a:p>
@@ -22348,22 +21907,21 @@
           <a:p>
             <a:pPr eaLnBrk="1" hangingPunct="1"/>
             <a:r>
-              <a:rPr lang="en-US" dirty="0" smtClean="0"/>
+              <a:rPr lang="en-US" dirty="0"/>
               <a:t>Walks around randomly, so very good at exploring the search space.</a:t>
             </a:r>
           </a:p>
           <a:p>
             <a:pPr eaLnBrk="1" hangingPunct="1"/>
             <a:r>
-              <a:rPr lang="en-US" dirty="0" smtClean="0"/>
+              <a:rPr lang="en-US" dirty="0"/>
               <a:t>Very good at finding the various “hills” in the search space.</a:t>
             </a:r>
-            <a:endParaRPr lang="en-US" dirty="0"/>
           </a:p>
           <a:p>
             <a:pPr eaLnBrk="1" hangingPunct="1"/>
             <a:r>
-              <a:rPr lang="en-US" dirty="0" smtClean="0"/>
+              <a:rPr lang="en-US" dirty="0"/>
               <a:t>NOT good at climbing up hills or optimizing any promising solution states.</a:t>
             </a:r>
           </a:p>
@@ -22395,35 +21953,34 @@
               <a:buNone/>
             </a:pPr>
             <a:r>
-              <a:rPr lang="en-US" dirty="0" smtClean="0"/>
+              <a:rPr lang="en-US" dirty="0"/>
               <a:t>Hill Climbing</a:t>
             </a:r>
           </a:p>
           <a:p>
             <a:pPr eaLnBrk="1" hangingPunct="1"/>
-            <a:endParaRPr lang="en-US" dirty="0" smtClean="0"/>
+            <a:endParaRPr lang="en-US" dirty="0"/>
           </a:p>
           <a:p>
             <a:pPr eaLnBrk="1" hangingPunct="1"/>
             <a:r>
-              <a:rPr lang="en-US" dirty="0" smtClean="0"/>
+              <a:rPr lang="en-US" dirty="0"/>
               <a:t>Good at optimizing a solution state, due to climbing nature.</a:t>
             </a:r>
           </a:p>
           <a:p>
             <a:pPr eaLnBrk="1" hangingPunct="1"/>
             <a:r>
-              <a:rPr lang="en-US" dirty="0" smtClean="0"/>
+              <a:rPr lang="en-US" dirty="0"/>
               <a:t>BAD at exploring various parts of search space.</a:t>
             </a:r>
           </a:p>
           <a:p>
             <a:pPr eaLnBrk="1" hangingPunct="1"/>
             <a:r>
-              <a:rPr lang="en-US" dirty="0" smtClean="0"/>
+              <a:rPr lang="en-US" dirty="0"/>
               <a:t>Often stuck in local maxima.</a:t>
             </a:r>
-            <a:endParaRPr lang="en-US" dirty="0"/>
           </a:p>
         </p:txBody>
       </p:sp>
@@ -22437,13 +21994,6 @@
   <p:clrMapOvr>
     <a:masterClrMapping/>
   </p:clrMapOvr>
-  <p:timing>
-    <p:tnLst>
-      <p:par>
-        <p:cTn id="1" dur="indefinite" restart="never" nodeType="tmRoot"/>
-      </p:par>
-    </p:tnLst>
-  </p:timing>
 </p:sld>
 </file>
 
@@ -22481,7 +22031,7 @@
           <a:p>
             <a:pPr eaLnBrk="1" hangingPunct="1"/>
             <a:r>
-              <a:rPr lang="en-US" dirty="0" smtClean="0"/>
+              <a:rPr lang="en-US" dirty="0"/>
               <a:t>Random Walk vs. Hill Climbing</a:t>
             </a:r>
           </a:p>
@@ -22513,7 +22063,7 @@
               <a:buNone/>
             </a:pPr>
             <a:r>
-              <a:rPr lang="en-US" dirty="0" smtClean="0"/>
+              <a:rPr lang="en-US" dirty="0"/>
               <a:t>Pseudo code for both algorithms</a:t>
             </a:r>
           </a:p>
@@ -22526,7 +22076,7 @@
               <a:buNone/>
             </a:pPr>
             <a:r>
-              <a:rPr lang="en-US" dirty="0" smtClean="0"/>
+              <a:rPr lang="en-US" dirty="0"/>
               <a:t>Given current state S</a:t>
             </a:r>
           </a:p>
@@ -22535,7 +22085,7 @@
               <a:buNone/>
             </a:pPr>
             <a:r>
-              <a:rPr lang="en-US" dirty="0" smtClean="0"/>
+              <a:rPr lang="en-US" dirty="0"/>
               <a:t>Generate neighbor state S’:</a:t>
             </a:r>
           </a:p>
@@ -22545,26 +22095,22 @@
             </a:pPr>
             <a:r>
               <a:rPr lang="en-US" dirty="0"/>
-              <a:t>	</a:t>
-            </a:r>
-            <a:r>
-              <a:rPr lang="en-US" dirty="0" smtClean="0"/>
-              <a:t>if (</a:t>
-            </a:r>
-            <a:r>
-              <a:rPr lang="en-US" dirty="0" err="1" smtClean="0"/>
+              <a:t>	if (</a:t>
+            </a:r>
+            <a:r>
+              <a:rPr lang="en-US" dirty="0" err="1"/>
               <a:t>util</a:t>
             </a:r>
             <a:r>
-              <a:rPr lang="en-US" dirty="0" smtClean="0"/>
+              <a:rPr lang="en-US" dirty="0"/>
               <a:t>(S’) &gt; </a:t>
             </a:r>
             <a:r>
-              <a:rPr lang="en-US" dirty="0" err="1" smtClean="0"/>
+              <a:rPr lang="en-US" dirty="0" err="1"/>
               <a:t>util</a:t>
             </a:r>
             <a:r>
-              <a:rPr lang="en-US" dirty="0" smtClean="0"/>
+              <a:rPr lang="en-US" dirty="0"/>
               <a:t>(S)) move with probability p;</a:t>
             </a:r>
           </a:p>
@@ -22574,11 +22120,7 @@
             </a:pPr>
             <a:r>
               <a:rPr lang="en-US" dirty="0"/>
-              <a:t>	</a:t>
-            </a:r>
-            <a:r>
-              <a:rPr lang="en-US" dirty="0" smtClean="0"/>
-              <a:t>else move with probability 1-p;</a:t>
+              <a:t>	else move with probability 1-p;</a:t>
             </a:r>
           </a:p>
           <a:p>
@@ -22586,7 +22128,7 @@
               <a:buNone/>
             </a:pPr>
             <a:r>
-              <a:rPr lang="en-US" dirty="0" smtClean="0"/>
+              <a:rPr lang="en-US" dirty="0"/>
               <a:t>Repeat constant number of times</a:t>
             </a:r>
           </a:p>
@@ -22601,7 +22143,7 @@
               <a:buNone/>
             </a:pPr>
             <a:r>
-              <a:rPr lang="en-US" dirty="0" smtClean="0"/>
+              <a:rPr lang="en-US" dirty="0"/>
               <a:t>//For hill-climbing, p=1.0			For random-walk, p=0.5</a:t>
             </a:r>
           </a:p>
@@ -22610,14 +22152,14 @@
               <a:buNone/>
             </a:pPr>
             <a:r>
-              <a:rPr lang="en-US" dirty="0" smtClean="0"/>
+              <a:rPr lang="en-US" dirty="0"/>
               <a:t>//so ‘p’ is what gives us control over algorithm’s behavior…</a:t>
             </a:r>
             <a:r>
-              <a:rPr lang="en-US" dirty="0" err="1" smtClean="0"/>
+              <a:rPr lang="en-US" dirty="0" err="1"/>
               <a:t>hmmmmmm</a:t>
             </a:r>
-            <a:endParaRPr lang="en-US" dirty="0" smtClean="0"/>
+            <a:endParaRPr lang="en-US" dirty="0"/>
           </a:p>
         </p:txBody>
       </p:sp>
@@ -22631,13 +22173,6 @@
   <p:clrMapOvr>
     <a:masterClrMapping/>
   </p:clrMapOvr>
-  <p:timing>
-    <p:tnLst>
-      <p:par>
-        <p:cTn id="1" dur="indefinite" restart="never" nodeType="tmRoot"/>
-      </p:par>
-    </p:tnLst>
-  </p:timing>
 </p:sld>
 </file>
 

</xml_diff>